<commit_message>
Fix some list issues
</commit_message>
<xml_diff>
--- a/6 UI Objects JDI.pptx
+++ b/6 UI Objects JDI.pptx
@@ -5,7 +5,7 @@
     <p:sldMasterId id="2147483648" r:id="rId1"/>
   </p:sldMasterIdLst>
   <p:notesMasterIdLst>
-    <p:notesMasterId r:id="rId39"/>
+    <p:notesMasterId r:id="rId38"/>
   </p:notesMasterIdLst>
   <p:sldIdLst>
     <p:sldId id="279" r:id="rId2"/>
@@ -22,29 +22,28 @@
     <p:sldId id="287" r:id="rId13"/>
     <p:sldId id="263" r:id="rId14"/>
     <p:sldId id="264" r:id="rId15"/>
-    <p:sldId id="281" r:id="rId16"/>
-    <p:sldId id="265" r:id="rId17"/>
-    <p:sldId id="288" r:id="rId18"/>
-    <p:sldId id="266" r:id="rId19"/>
-    <p:sldId id="290" r:id="rId20"/>
-    <p:sldId id="291" r:id="rId21"/>
-    <p:sldId id="294" r:id="rId22"/>
-    <p:sldId id="295" r:id="rId23"/>
-    <p:sldId id="289" r:id="rId24"/>
-    <p:sldId id="267" r:id="rId25"/>
-    <p:sldId id="297" r:id="rId26"/>
-    <p:sldId id="268" r:id="rId27"/>
-    <p:sldId id="269" r:id="rId28"/>
-    <p:sldId id="292" r:id="rId29"/>
-    <p:sldId id="293" r:id="rId30"/>
-    <p:sldId id="296" r:id="rId31"/>
-    <p:sldId id="270" r:id="rId32"/>
-    <p:sldId id="271" r:id="rId33"/>
-    <p:sldId id="272" r:id="rId34"/>
-    <p:sldId id="273" r:id="rId35"/>
-    <p:sldId id="274" r:id="rId36"/>
-    <p:sldId id="275" r:id="rId37"/>
-    <p:sldId id="276" r:id="rId38"/>
+    <p:sldId id="265" r:id="rId16"/>
+    <p:sldId id="288" r:id="rId17"/>
+    <p:sldId id="266" r:id="rId18"/>
+    <p:sldId id="290" r:id="rId19"/>
+    <p:sldId id="291" r:id="rId20"/>
+    <p:sldId id="294" r:id="rId21"/>
+    <p:sldId id="295" r:id="rId22"/>
+    <p:sldId id="289" r:id="rId23"/>
+    <p:sldId id="267" r:id="rId24"/>
+    <p:sldId id="297" r:id="rId25"/>
+    <p:sldId id="268" r:id="rId26"/>
+    <p:sldId id="269" r:id="rId27"/>
+    <p:sldId id="292" r:id="rId28"/>
+    <p:sldId id="293" r:id="rId29"/>
+    <p:sldId id="296" r:id="rId30"/>
+    <p:sldId id="270" r:id="rId31"/>
+    <p:sldId id="271" r:id="rId32"/>
+    <p:sldId id="272" r:id="rId33"/>
+    <p:sldId id="273" r:id="rId34"/>
+    <p:sldId id="274" r:id="rId35"/>
+    <p:sldId id="275" r:id="rId36"/>
+    <p:sldId id="276" r:id="rId37"/>
   </p:sldIdLst>
   <p:sldSz cx="12192000" cy="6858000"/>
   <p:notesSz cx="6858000" cy="9144000"/>
@@ -5825,7 +5824,7 @@
           <a:p>
             <a:fld id="{22B8FCFE-F316-49C5-A3FC-507A450A88AB}" type="datetimeFigureOut">
               <a:rPr lang="en-US" smtClean="0"/>
-              <a:t>12/12/2016</a:t>
+              <a:t>2/22/2017</a:t>
             </a:fld>
             <a:endParaRPr lang="en-US"/>
           </a:p>
@@ -6344,7 +6343,7 @@
     </p:spTree>
     <p:extLst>
       <p:ext uri="{BB962C8B-B14F-4D97-AF65-F5344CB8AC3E}">
-        <p14:creationId xmlns:p14="http://schemas.microsoft.com/office/powerpoint/2010/main" val="3496651408"/>
+        <p14:creationId xmlns:p14="http://schemas.microsoft.com/office/powerpoint/2010/main" val="437436686"/>
       </p:ext>
     </p:extLst>
   </p:cSld>
@@ -6422,7 +6421,7 @@
             <a:fld id="{0AA64A5F-1A9B-4C99-97D2-09882A049204}" type="slidenum">
               <a:rPr lang="ru-RU" smtClean="0"/>
               <a:pPr/>
-              <a:t>16</a:t>
+              <a:t>17</a:t>
             </a:fld>
             <a:endParaRPr lang="ru-RU"/>
           </a:p>
@@ -6431,7 +6430,7 @@
     </p:spTree>
     <p:extLst>
       <p:ext uri="{BB962C8B-B14F-4D97-AF65-F5344CB8AC3E}">
-        <p14:creationId xmlns:p14="http://schemas.microsoft.com/office/powerpoint/2010/main" val="437436686"/>
+        <p14:creationId xmlns:p14="http://schemas.microsoft.com/office/powerpoint/2010/main" val="3323339145"/>
       </p:ext>
     </p:extLst>
   </p:cSld>
@@ -6518,7 +6517,7 @@
     </p:spTree>
     <p:extLst>
       <p:ext uri="{BB962C8B-B14F-4D97-AF65-F5344CB8AC3E}">
-        <p14:creationId xmlns:p14="http://schemas.microsoft.com/office/powerpoint/2010/main" val="3323339145"/>
+        <p14:creationId xmlns:p14="http://schemas.microsoft.com/office/powerpoint/2010/main" val="490245004"/>
       </p:ext>
     </p:extLst>
   </p:cSld>
@@ -6529,6 +6528,104 @@
 </file>
 
 <file path=ppt/notesSlides/notesSlide14.xml><?xml version="1.0" encoding="utf-8"?>
+<p:notes xmlns:a="http://schemas.openxmlformats.org/drawingml/2006/main" xmlns:r="http://schemas.openxmlformats.org/officeDocument/2006/relationships" xmlns:p="http://schemas.openxmlformats.org/presentationml/2006/main">
+  <p:cSld>
+    <p:spTree>
+      <p:nvGrpSpPr>
+        <p:cNvPr id="1" name=""/>
+        <p:cNvGrpSpPr/>
+        <p:nvPr/>
+      </p:nvGrpSpPr>
+      <p:grpSpPr>
+        <a:xfrm>
+          <a:off x="0" y="0"/>
+          <a:ext cx="0" cy="0"/>
+          <a:chOff x="0" y="0"/>
+          <a:chExt cx="0" cy="0"/>
+        </a:xfrm>
+      </p:grpSpPr>
+      <p:sp>
+        <p:nvSpPr>
+          <p:cNvPr id="2" name="Slide Image Placeholder 1"/>
+          <p:cNvSpPr>
+            <a:spLocks noGrp="1" noRot="1" noChangeAspect="1"/>
+          </p:cNvSpPr>
+          <p:nvPr>
+            <p:ph type="sldImg"/>
+          </p:nvPr>
+        </p:nvSpPr>
+        <p:spPr/>
+      </p:sp>
+      <p:sp>
+        <p:nvSpPr>
+          <p:cNvPr id="3" name="Notes Placeholder 2"/>
+          <p:cNvSpPr>
+            <a:spLocks noGrp="1"/>
+          </p:cNvSpPr>
+          <p:nvPr>
+            <p:ph type="body" idx="1"/>
+          </p:nvPr>
+        </p:nvSpPr>
+        <p:spPr/>
+        <p:txBody>
+          <a:bodyPr/>
+          <a:lstStyle/>
+          <a:p>
+            <a:r>
+              <a:rPr lang="en-US" dirty="0" smtClean="0"/>
+              <a:t>Why we develop it?</a:t>
+            </a:r>
+          </a:p>
+          <a:p>
+            <a:r>
+              <a:rPr lang="en-US" dirty="0" smtClean="0"/>
+              <a:t>Some</a:t>
+            </a:r>
+            <a:r>
+              <a:rPr lang="en-US" baseline="0" dirty="0" smtClean="0"/>
+              <a:t> people formulate it as “Why you create one more wheel”</a:t>
+            </a:r>
+            <a:endParaRPr lang="en-US" dirty="0"/>
+          </a:p>
+        </p:txBody>
+      </p:sp>
+      <p:sp>
+        <p:nvSpPr>
+          <p:cNvPr id="4" name="Slide Number Placeholder 3"/>
+          <p:cNvSpPr>
+            <a:spLocks noGrp="1"/>
+          </p:cNvSpPr>
+          <p:nvPr>
+            <p:ph type="sldNum" sz="quarter" idx="10"/>
+          </p:nvPr>
+        </p:nvSpPr>
+        <p:spPr/>
+        <p:txBody>
+          <a:bodyPr/>
+          <a:lstStyle/>
+          <a:p>
+            <a:fld id="{3C58FE2F-B1C4-47FA-8554-15D93AB392AE}" type="slidenum">
+              <a:rPr lang="en-US" smtClean="0"/>
+              <a:t>19</a:t>
+            </a:fld>
+            <a:endParaRPr lang="en-US"/>
+          </a:p>
+        </p:txBody>
+      </p:sp>
+    </p:spTree>
+    <p:extLst>
+      <p:ext uri="{BB962C8B-B14F-4D97-AF65-F5344CB8AC3E}">
+        <p14:creationId xmlns:p14="http://schemas.microsoft.com/office/powerpoint/2010/main" val="3218128217"/>
+      </p:ext>
+    </p:extLst>
+  </p:cSld>
+  <p:clrMapOvr>
+    <a:masterClrMapping/>
+  </p:clrMapOvr>
+</p:notes>
+</file>
+
+<file path=ppt/notesSlides/notesSlide15.xml><?xml version="1.0" encoding="utf-8"?>
 <p:notes xmlns:a="http://schemas.openxmlformats.org/drawingml/2006/main" xmlns:r="http://schemas.openxmlformats.org/officeDocument/2006/relationships" xmlns:p="http://schemas.openxmlformats.org/presentationml/2006/main">
   <p:cSld>
     <p:spTree>
@@ -6574,6 +6671,41 @@
           </a:bodyPr>
           <a:lstStyle/>
           <a:p>
+            <a:pPr marL="0" indent="0">
+              <a:buNone/>
+            </a:pPr>
+            <a:r>
+              <a:rPr lang="en-US" sz="1200" b="1" dirty="0" smtClean="0"/>
+              <a:t>LIVE demo</a:t>
+            </a:r>
+          </a:p>
+          <a:p>
+            <a:pPr marL="0" indent="0">
+              <a:buNone/>
+            </a:pPr>
+            <a:r>
+              <a:rPr lang="ru-RU" sz="1200" b="1" dirty="0" smtClean="0"/>
+              <a:t>Есть готовые </a:t>
+            </a:r>
+            <a:r>
+              <a:rPr lang="en-US" sz="1200" b="1" dirty="0" smtClean="0"/>
+              <a:t>UI Objects. </a:t>
+            </a:r>
+            <a:r>
+              <a:rPr lang="ru-RU" sz="1200" b="1" dirty="0" smtClean="0"/>
+              <a:t>Переделка Селениум кода (с вейтами) под </a:t>
+            </a:r>
+            <a:r>
+              <a:rPr lang="en-US" sz="1200" b="1" dirty="0" smtClean="0"/>
+              <a:t>UI </a:t>
+            </a:r>
+            <a:r>
+              <a:rPr lang="ru-RU" sz="1200" b="1" dirty="0" smtClean="0"/>
+              <a:t>объекты</a:t>
+            </a:r>
+            <a:endParaRPr lang="en-US" sz="1200" b="1" dirty="0" smtClean="0"/>
+          </a:p>
+          <a:p>
             <a:endParaRPr lang="ru-RU" sz="1200" dirty="0"/>
           </a:p>
         </p:txBody>
@@ -6596,7 +6728,7 @@
             <a:fld id="{0AA64A5F-1A9B-4C99-97D2-09882A049204}" type="slidenum">
               <a:rPr lang="ru-RU" smtClean="0"/>
               <a:pPr/>
-              <a:t>19</a:t>
+              <a:t>20</a:t>
             </a:fld>
             <a:endParaRPr lang="ru-RU"/>
           </a:p>
@@ -6605,105 +6737,7 @@
     </p:spTree>
     <p:extLst>
       <p:ext uri="{BB962C8B-B14F-4D97-AF65-F5344CB8AC3E}">
-        <p14:creationId xmlns:p14="http://schemas.microsoft.com/office/powerpoint/2010/main" val="490245004"/>
-      </p:ext>
-    </p:extLst>
-  </p:cSld>
-  <p:clrMapOvr>
-    <a:masterClrMapping/>
-  </p:clrMapOvr>
-</p:notes>
-</file>
-
-<file path=ppt/notesSlides/notesSlide15.xml><?xml version="1.0" encoding="utf-8"?>
-<p:notes xmlns:a="http://schemas.openxmlformats.org/drawingml/2006/main" xmlns:r="http://schemas.openxmlformats.org/officeDocument/2006/relationships" xmlns:p="http://schemas.openxmlformats.org/presentationml/2006/main">
-  <p:cSld>
-    <p:spTree>
-      <p:nvGrpSpPr>
-        <p:cNvPr id="1" name=""/>
-        <p:cNvGrpSpPr/>
-        <p:nvPr/>
-      </p:nvGrpSpPr>
-      <p:grpSpPr>
-        <a:xfrm>
-          <a:off x="0" y="0"/>
-          <a:ext cx="0" cy="0"/>
-          <a:chOff x="0" y="0"/>
-          <a:chExt cx="0" cy="0"/>
-        </a:xfrm>
-      </p:grpSpPr>
-      <p:sp>
-        <p:nvSpPr>
-          <p:cNvPr id="2" name="Slide Image Placeholder 1"/>
-          <p:cNvSpPr>
-            <a:spLocks noGrp="1" noRot="1" noChangeAspect="1"/>
-          </p:cNvSpPr>
-          <p:nvPr>
-            <p:ph type="sldImg"/>
-          </p:nvPr>
-        </p:nvSpPr>
-        <p:spPr/>
-      </p:sp>
-      <p:sp>
-        <p:nvSpPr>
-          <p:cNvPr id="3" name="Notes Placeholder 2"/>
-          <p:cNvSpPr>
-            <a:spLocks noGrp="1"/>
-          </p:cNvSpPr>
-          <p:nvPr>
-            <p:ph type="body" idx="1"/>
-          </p:nvPr>
-        </p:nvSpPr>
-        <p:spPr/>
-        <p:txBody>
-          <a:bodyPr/>
-          <a:lstStyle/>
-          <a:p>
-            <a:r>
-              <a:rPr lang="en-US" dirty="0" smtClean="0"/>
-              <a:t>Why we develop it?</a:t>
-            </a:r>
-          </a:p>
-          <a:p>
-            <a:r>
-              <a:rPr lang="en-US" dirty="0" smtClean="0"/>
-              <a:t>Some</a:t>
-            </a:r>
-            <a:r>
-              <a:rPr lang="en-US" baseline="0" dirty="0" smtClean="0"/>
-              <a:t> people formulate it as “Why you create one more wheel”</a:t>
-            </a:r>
-            <a:endParaRPr lang="en-US" dirty="0"/>
-          </a:p>
-        </p:txBody>
-      </p:sp>
-      <p:sp>
-        <p:nvSpPr>
-          <p:cNvPr id="4" name="Slide Number Placeholder 3"/>
-          <p:cNvSpPr>
-            <a:spLocks noGrp="1"/>
-          </p:cNvSpPr>
-          <p:nvPr>
-            <p:ph type="sldNum" sz="quarter" idx="10"/>
-          </p:nvPr>
-        </p:nvSpPr>
-        <p:spPr/>
-        <p:txBody>
-          <a:bodyPr/>
-          <a:lstStyle/>
-          <a:p>
-            <a:fld id="{3C58FE2F-B1C4-47FA-8554-15D93AB392AE}" type="slidenum">
-              <a:rPr lang="en-US" smtClean="0"/>
-              <a:t>20</a:t>
-            </a:fld>
-            <a:endParaRPr lang="en-US"/>
-          </a:p>
-        </p:txBody>
-      </p:sp>
-    </p:spTree>
-    <p:extLst>
-      <p:ext uri="{BB962C8B-B14F-4D97-AF65-F5344CB8AC3E}">
-        <p14:creationId xmlns:p14="http://schemas.microsoft.com/office/powerpoint/2010/main" val="3218128217"/>
+        <p14:creationId xmlns:p14="http://schemas.microsoft.com/office/powerpoint/2010/main" val="639079602"/>
       </p:ext>
     </p:extLst>
   </p:cSld>
@@ -6825,7 +6859,7 @@
     </p:spTree>
     <p:extLst>
       <p:ext uri="{BB962C8B-B14F-4D97-AF65-F5344CB8AC3E}">
-        <p14:creationId xmlns:p14="http://schemas.microsoft.com/office/powerpoint/2010/main" val="639079602"/>
+        <p14:creationId xmlns:p14="http://schemas.microsoft.com/office/powerpoint/2010/main" val="2966055778"/>
       </p:ext>
     </p:extLst>
   </p:cSld>
@@ -6881,41 +6915,6 @@
           </a:bodyPr>
           <a:lstStyle/>
           <a:p>
-            <a:pPr marL="0" indent="0">
-              <a:buNone/>
-            </a:pPr>
-            <a:r>
-              <a:rPr lang="en-US" sz="1200" b="1" dirty="0" smtClean="0"/>
-              <a:t>LIVE demo</a:t>
-            </a:r>
-          </a:p>
-          <a:p>
-            <a:pPr marL="0" indent="0">
-              <a:buNone/>
-            </a:pPr>
-            <a:r>
-              <a:rPr lang="ru-RU" sz="1200" b="1" dirty="0" smtClean="0"/>
-              <a:t>Есть готовые </a:t>
-            </a:r>
-            <a:r>
-              <a:rPr lang="en-US" sz="1200" b="1" dirty="0" smtClean="0"/>
-              <a:t>UI Objects. </a:t>
-            </a:r>
-            <a:r>
-              <a:rPr lang="ru-RU" sz="1200" b="1" dirty="0" smtClean="0"/>
-              <a:t>Переделка Селениум кода (с вейтами) под </a:t>
-            </a:r>
-            <a:r>
-              <a:rPr lang="en-US" sz="1200" b="1" dirty="0" smtClean="0"/>
-              <a:t>UI </a:t>
-            </a:r>
-            <a:r>
-              <a:rPr lang="ru-RU" sz="1200" b="1" dirty="0" smtClean="0"/>
-              <a:t>объекты</a:t>
-            </a:r>
-            <a:endParaRPr lang="en-US" sz="1200" b="1" dirty="0" smtClean="0"/>
-          </a:p>
-          <a:p>
             <a:endParaRPr lang="ru-RU" sz="1200" dirty="0"/>
           </a:p>
         </p:txBody>
@@ -6938,7 +6937,7 @@
             <a:fld id="{0AA64A5F-1A9B-4C99-97D2-09882A049204}" type="slidenum">
               <a:rPr lang="ru-RU" smtClean="0"/>
               <a:pPr/>
-              <a:t>22</a:t>
+              <a:t>23</a:t>
             </a:fld>
             <a:endParaRPr lang="ru-RU"/>
           </a:p>
@@ -6947,7 +6946,7 @@
     </p:spTree>
     <p:extLst>
       <p:ext uri="{BB962C8B-B14F-4D97-AF65-F5344CB8AC3E}">
-        <p14:creationId xmlns:p14="http://schemas.microsoft.com/office/powerpoint/2010/main" val="2966055778"/>
+        <p14:creationId xmlns:p14="http://schemas.microsoft.com/office/powerpoint/2010/main" val="2530003567"/>
       </p:ext>
     </p:extLst>
   </p:cSld>
@@ -7034,7 +7033,7 @@
     </p:spTree>
     <p:extLst>
       <p:ext uri="{BB962C8B-B14F-4D97-AF65-F5344CB8AC3E}">
-        <p14:creationId xmlns:p14="http://schemas.microsoft.com/office/powerpoint/2010/main" val="2530003567"/>
+        <p14:creationId xmlns:p14="http://schemas.microsoft.com/office/powerpoint/2010/main" val="1649704003"/>
       </p:ext>
     </p:extLst>
   </p:cSld>
@@ -7121,7 +7120,7 @@
     </p:spTree>
     <p:extLst>
       <p:ext uri="{BB962C8B-B14F-4D97-AF65-F5344CB8AC3E}">
-        <p14:creationId xmlns:p14="http://schemas.microsoft.com/office/powerpoint/2010/main" val="1649704003"/>
+        <p14:creationId xmlns:p14="http://schemas.microsoft.com/office/powerpoint/2010/main" val="3116169655"/>
       </p:ext>
     </p:extLst>
   </p:cSld>
@@ -7264,7 +7263,40 @@
           </a:bodyPr>
           <a:lstStyle/>
           <a:p>
-            <a:endParaRPr lang="ru-RU" sz="1200" dirty="0"/>
+            <a:pPr marL="0" marR="0" indent="0" algn="l" defTabSz="914400" rtl="0" eaLnBrk="1" fontAlgn="auto" latinLnBrk="0" hangingPunct="1">
+              <a:lnSpc>
+                <a:spcPct val="100000"/>
+              </a:lnSpc>
+              <a:spcBef>
+                <a:spcPts val="0"/>
+              </a:spcBef>
+              <a:spcAft>
+                <a:spcPts val="0"/>
+              </a:spcAft>
+              <a:buClrTx/>
+              <a:buSzTx/>
+              <a:buFontTx/>
+              <a:buNone/>
+              <a:tabLst/>
+              <a:defRPr/>
+            </a:pPr>
+            <a:r>
+              <a:rPr lang="en-US" sz="1200" b="1" dirty="0" smtClean="0"/>
+              <a:t>Demo </a:t>
+            </a:r>
+            <a:r>
+              <a:rPr lang="ru-RU" sz="1200" b="1" dirty="0" smtClean="0"/>
+              <a:t>Описание</a:t>
+            </a:r>
+            <a:r>
+              <a:rPr lang="ru-RU" sz="1200" b="1" baseline="0" dirty="0" smtClean="0"/>
+              <a:t> </a:t>
+            </a:r>
+            <a:r>
+              <a:rPr lang="en-US" sz="1200" b="1" baseline="0" dirty="0" smtClean="0"/>
+              <a:t>UI Objects</a:t>
+            </a:r>
+            <a:endParaRPr lang="en-US" sz="1200" b="1" dirty="0" smtClean="0"/>
           </a:p>
         </p:txBody>
       </p:sp>
@@ -7295,7 +7327,7 @@
     </p:spTree>
     <p:extLst>
       <p:ext uri="{BB962C8B-B14F-4D97-AF65-F5344CB8AC3E}">
-        <p14:creationId xmlns:p14="http://schemas.microsoft.com/office/powerpoint/2010/main" val="3116169655"/>
+        <p14:creationId xmlns:p14="http://schemas.microsoft.com/office/powerpoint/2010/main" val="321718417"/>
       </p:ext>
     </p:extLst>
   </p:cSld>
@@ -7351,40 +7383,7 @@
           </a:bodyPr>
           <a:lstStyle/>
           <a:p>
-            <a:pPr marL="0" marR="0" indent="0" algn="l" defTabSz="914400" rtl="0" eaLnBrk="1" fontAlgn="auto" latinLnBrk="0" hangingPunct="1">
-              <a:lnSpc>
-                <a:spcPct val="100000"/>
-              </a:lnSpc>
-              <a:spcBef>
-                <a:spcPts val="0"/>
-              </a:spcBef>
-              <a:spcAft>
-                <a:spcPts val="0"/>
-              </a:spcAft>
-              <a:buClrTx/>
-              <a:buSzTx/>
-              <a:buFontTx/>
-              <a:buNone/>
-              <a:tabLst/>
-              <a:defRPr/>
-            </a:pPr>
-            <a:r>
-              <a:rPr lang="en-US" sz="1200" b="1" dirty="0" smtClean="0"/>
-              <a:t>Demo </a:t>
-            </a:r>
-            <a:r>
-              <a:rPr lang="ru-RU" sz="1200" b="1" dirty="0" smtClean="0"/>
-              <a:t>Описание</a:t>
-            </a:r>
-            <a:r>
-              <a:rPr lang="ru-RU" sz="1200" b="1" baseline="0" dirty="0" smtClean="0"/>
-              <a:t> </a:t>
-            </a:r>
-            <a:r>
-              <a:rPr lang="en-US" sz="1200" b="1" baseline="0" dirty="0" smtClean="0"/>
-              <a:t>UI Objects</a:t>
-            </a:r>
-            <a:endParaRPr lang="en-US" sz="1200" b="1" dirty="0" smtClean="0"/>
+            <a:endParaRPr lang="ru-RU" sz="1200" dirty="0"/>
           </a:p>
         </p:txBody>
       </p:sp>
@@ -7406,7 +7405,7 @@
             <a:fld id="{0AA64A5F-1A9B-4C99-97D2-09882A049204}" type="slidenum">
               <a:rPr lang="ru-RU" smtClean="0"/>
               <a:pPr/>
-              <a:t>27</a:t>
+              <a:t>28</a:t>
             </a:fld>
             <a:endParaRPr lang="ru-RU"/>
           </a:p>
@@ -7415,7 +7414,7 @@
     </p:spTree>
     <p:extLst>
       <p:ext uri="{BB962C8B-B14F-4D97-AF65-F5344CB8AC3E}">
-        <p14:creationId xmlns:p14="http://schemas.microsoft.com/office/powerpoint/2010/main" val="321718417"/>
+        <p14:creationId xmlns:p14="http://schemas.microsoft.com/office/powerpoint/2010/main" val="2325552539"/>
       </p:ext>
     </p:extLst>
   </p:cSld>
@@ -7471,7 +7470,48 @@
           </a:bodyPr>
           <a:lstStyle/>
           <a:p>
-            <a:endParaRPr lang="ru-RU" sz="1200" dirty="0"/>
+            <a:pPr marL="0" marR="0" indent="0" algn="l" defTabSz="914400" rtl="0" eaLnBrk="1" fontAlgn="auto" latinLnBrk="0" hangingPunct="1">
+              <a:lnSpc>
+                <a:spcPct val="100000"/>
+              </a:lnSpc>
+              <a:spcBef>
+                <a:spcPts val="0"/>
+              </a:spcBef>
+              <a:spcAft>
+                <a:spcPts val="0"/>
+              </a:spcAft>
+              <a:buClrTx/>
+              <a:buSzTx/>
+              <a:buFontTx/>
+              <a:buNone/>
+              <a:tabLst/>
+              <a:defRPr/>
+            </a:pPr>
+            <a:r>
+              <a:rPr lang="en-US" sz="1200" b="1" dirty="0" smtClean="0"/>
+              <a:t>Demo </a:t>
+            </a:r>
+            <a:r>
+              <a:rPr lang="ru-RU" sz="1200" b="1" dirty="0" smtClean="0"/>
+              <a:t>Замена </a:t>
+            </a:r>
+            <a:r>
+              <a:rPr lang="en-US" sz="1200" b="1" dirty="0" smtClean="0"/>
+              <a:t>Selenium Page Objects </a:t>
+            </a:r>
+            <a:r>
+              <a:rPr lang="ru-RU" sz="1200" b="1" dirty="0" smtClean="0"/>
+              <a:t>на </a:t>
+            </a:r>
+            <a:r>
+              <a:rPr lang="en-US" sz="1200" b="1" dirty="0" smtClean="0"/>
+              <a:t>JDI</a:t>
+            </a:r>
+            <a:r>
+              <a:rPr lang="en-US" sz="1200" b="1" baseline="0" dirty="0" smtClean="0"/>
+              <a:t> UI Objects</a:t>
+            </a:r>
+            <a:endParaRPr lang="en-US" sz="1200" b="1" dirty="0" smtClean="0"/>
           </a:p>
         </p:txBody>
       </p:sp>
@@ -7502,7 +7542,7 @@
     </p:spTree>
     <p:extLst>
       <p:ext uri="{BB962C8B-B14F-4D97-AF65-F5344CB8AC3E}">
-        <p14:creationId xmlns:p14="http://schemas.microsoft.com/office/powerpoint/2010/main" val="2325552539"/>
+        <p14:creationId xmlns:p14="http://schemas.microsoft.com/office/powerpoint/2010/main" val="3107995884"/>
       </p:ext>
     </p:extLst>
   </p:cSld>
@@ -7558,48 +7598,7 @@
           </a:bodyPr>
           <a:lstStyle/>
           <a:p>
-            <a:pPr marL="0" marR="0" indent="0" algn="l" defTabSz="914400" rtl="0" eaLnBrk="1" fontAlgn="auto" latinLnBrk="0" hangingPunct="1">
-              <a:lnSpc>
-                <a:spcPct val="100000"/>
-              </a:lnSpc>
-              <a:spcBef>
-                <a:spcPts val="0"/>
-              </a:spcBef>
-              <a:spcAft>
-                <a:spcPts val="0"/>
-              </a:spcAft>
-              <a:buClrTx/>
-              <a:buSzTx/>
-              <a:buFontTx/>
-              <a:buNone/>
-              <a:tabLst/>
-              <a:defRPr/>
-            </a:pPr>
-            <a:r>
-              <a:rPr lang="en-US" sz="1200" b="1" dirty="0" smtClean="0"/>
-              <a:t>Demo </a:t>
-            </a:r>
-            <a:r>
-              <a:rPr lang="ru-RU" sz="1200" b="1" dirty="0" smtClean="0"/>
-              <a:t>Замена </a:t>
-            </a:r>
-            <a:r>
-              <a:rPr lang="en-US" sz="1200" b="1" dirty="0" smtClean="0"/>
-              <a:t>Selenium Page Objects </a:t>
-            </a:r>
-            <a:r>
-              <a:rPr lang="ru-RU" sz="1200" b="1" dirty="0" smtClean="0"/>
-              <a:t>на </a:t>
-            </a:r>
-            <a:r>
-              <a:rPr lang="en-US" sz="1200" b="1" dirty="0" smtClean="0"/>
-              <a:t>JDI</a:t>
-            </a:r>
-            <a:r>
-              <a:rPr lang="en-US" sz="1200" b="1" baseline="0" dirty="0" smtClean="0"/>
-              <a:t> UI Objects</a:t>
-            </a:r>
-            <a:endParaRPr lang="en-US" sz="1200" b="1" dirty="0" smtClean="0"/>
+            <a:endParaRPr lang="ru-RU" sz="1200" dirty="0"/>
           </a:p>
         </p:txBody>
       </p:sp>
@@ -7630,7 +7629,7 @@
     </p:spTree>
     <p:extLst>
       <p:ext uri="{BB962C8B-B14F-4D97-AF65-F5344CB8AC3E}">
-        <p14:creationId xmlns:p14="http://schemas.microsoft.com/office/powerpoint/2010/main" val="3107995884"/>
+        <p14:creationId xmlns:p14="http://schemas.microsoft.com/office/powerpoint/2010/main" val="637258384"/>
       </p:ext>
     </p:extLst>
   </p:cSld>
@@ -7717,7 +7716,7 @@
     </p:spTree>
     <p:extLst>
       <p:ext uri="{BB962C8B-B14F-4D97-AF65-F5344CB8AC3E}">
-        <p14:creationId xmlns:p14="http://schemas.microsoft.com/office/powerpoint/2010/main" val="637258384"/>
+        <p14:creationId xmlns:p14="http://schemas.microsoft.com/office/powerpoint/2010/main" val="2261863821"/>
       </p:ext>
     </p:extLst>
   </p:cSld>
@@ -7804,7 +7803,7 @@
     </p:spTree>
     <p:extLst>
       <p:ext uri="{BB962C8B-B14F-4D97-AF65-F5344CB8AC3E}">
-        <p14:creationId xmlns:p14="http://schemas.microsoft.com/office/powerpoint/2010/main" val="2261863821"/>
+        <p14:creationId xmlns:p14="http://schemas.microsoft.com/office/powerpoint/2010/main" val="2687487082"/>
       </p:ext>
     </p:extLst>
   </p:cSld>
@@ -7891,7 +7890,7 @@
     </p:spTree>
     <p:extLst>
       <p:ext uri="{BB962C8B-B14F-4D97-AF65-F5344CB8AC3E}">
-        <p14:creationId xmlns:p14="http://schemas.microsoft.com/office/powerpoint/2010/main" val="2687487082"/>
+        <p14:creationId xmlns:p14="http://schemas.microsoft.com/office/powerpoint/2010/main" val="1412051946"/>
       </p:ext>
     </p:extLst>
   </p:cSld>
@@ -7947,7 +7946,48 @@
           </a:bodyPr>
           <a:lstStyle/>
           <a:p>
-            <a:endParaRPr lang="ru-RU" sz="1200" dirty="0"/>
+            <a:pPr marL="0" marR="0" indent="0" algn="l" defTabSz="914400" rtl="0" eaLnBrk="1" fontAlgn="auto" latinLnBrk="0" hangingPunct="1">
+              <a:lnSpc>
+                <a:spcPct val="100000"/>
+              </a:lnSpc>
+              <a:spcBef>
+                <a:spcPts val="0"/>
+              </a:spcBef>
+              <a:spcAft>
+                <a:spcPts val="0"/>
+              </a:spcAft>
+              <a:buClrTx/>
+              <a:buSzTx/>
+              <a:buFontTx/>
+              <a:buNone/>
+              <a:tabLst/>
+              <a:defRPr/>
+            </a:pPr>
+            <a:r>
+              <a:rPr lang="en-US" sz="1200" b="1" dirty="0" smtClean="0"/>
+              <a:t>Demo </a:t>
+            </a:r>
+            <a:r>
+              <a:rPr lang="ru-RU" sz="1200" b="1" dirty="0" smtClean="0"/>
+              <a:t>Замена </a:t>
+            </a:r>
+            <a:r>
+              <a:rPr lang="en-US" sz="1200" b="1" dirty="0" smtClean="0"/>
+              <a:t>Selenium Page Objects </a:t>
+            </a:r>
+            <a:r>
+              <a:rPr lang="ru-RU" sz="1200" b="1" dirty="0" smtClean="0"/>
+              <a:t>на </a:t>
+            </a:r>
+            <a:r>
+              <a:rPr lang="en-US" sz="1200" b="1" dirty="0" smtClean="0"/>
+              <a:t>JDI</a:t>
+            </a:r>
+            <a:r>
+              <a:rPr lang="en-US" sz="1200" b="1" baseline="0" dirty="0" smtClean="0"/>
+              <a:t> UI Objects</a:t>
+            </a:r>
+            <a:endParaRPr lang="en-US" sz="1200" b="1" dirty="0" smtClean="0"/>
           </a:p>
         </p:txBody>
       </p:sp>
@@ -7978,7 +8018,7 @@
     </p:spTree>
     <p:extLst>
       <p:ext uri="{BB962C8B-B14F-4D97-AF65-F5344CB8AC3E}">
-        <p14:creationId xmlns:p14="http://schemas.microsoft.com/office/powerpoint/2010/main" val="1412051946"/>
+        <p14:creationId xmlns:p14="http://schemas.microsoft.com/office/powerpoint/2010/main" val="2630109775"/>
       </p:ext>
     </p:extLst>
   </p:cSld>
@@ -8034,48 +8074,7 @@
           </a:bodyPr>
           <a:lstStyle/>
           <a:p>
-            <a:pPr marL="0" marR="0" indent="0" algn="l" defTabSz="914400" rtl="0" eaLnBrk="1" fontAlgn="auto" latinLnBrk="0" hangingPunct="1">
-              <a:lnSpc>
-                <a:spcPct val="100000"/>
-              </a:lnSpc>
-              <a:spcBef>
-                <a:spcPts val="0"/>
-              </a:spcBef>
-              <a:spcAft>
-                <a:spcPts val="0"/>
-              </a:spcAft>
-              <a:buClrTx/>
-              <a:buSzTx/>
-              <a:buFontTx/>
-              <a:buNone/>
-              <a:tabLst/>
-              <a:defRPr/>
-            </a:pPr>
-            <a:r>
-              <a:rPr lang="en-US" sz="1200" b="1" dirty="0" smtClean="0"/>
-              <a:t>Demo </a:t>
-            </a:r>
-            <a:r>
-              <a:rPr lang="ru-RU" sz="1200" b="1" dirty="0" smtClean="0"/>
-              <a:t>Замена </a:t>
-            </a:r>
-            <a:r>
-              <a:rPr lang="en-US" sz="1200" b="1" dirty="0" smtClean="0"/>
-              <a:t>Selenium Page Objects </a:t>
-            </a:r>
-            <a:r>
-              <a:rPr lang="ru-RU" sz="1200" b="1" dirty="0" smtClean="0"/>
-              <a:t>на </a:t>
-            </a:r>
-            <a:r>
-              <a:rPr lang="en-US" sz="1200" b="1" dirty="0" smtClean="0"/>
-              <a:t>JDI</a:t>
-            </a:r>
-            <a:r>
-              <a:rPr lang="en-US" sz="1200" b="1" baseline="0" dirty="0" smtClean="0"/>
-              <a:t> UI Objects</a:t>
-            </a:r>
-            <a:endParaRPr lang="en-US" sz="1200" b="1" dirty="0" smtClean="0"/>
+            <a:endParaRPr lang="ru-RU" sz="1200" dirty="0"/>
           </a:p>
         </p:txBody>
       </p:sp>
@@ -8106,7 +8105,7 @@
     </p:spTree>
     <p:extLst>
       <p:ext uri="{BB962C8B-B14F-4D97-AF65-F5344CB8AC3E}">
-        <p14:creationId xmlns:p14="http://schemas.microsoft.com/office/powerpoint/2010/main" val="2630109775"/>
+        <p14:creationId xmlns:p14="http://schemas.microsoft.com/office/powerpoint/2010/main" val="1723964919"/>
       </p:ext>
     </p:extLst>
   </p:cSld>
@@ -8135,7 +8134,7 @@
       </p:grpSpPr>
       <p:sp>
         <p:nvSpPr>
-          <p:cNvPr id="2" name="Образ слайда 1"/>
+          <p:cNvPr id="2" name="Slide Image Placeholder 1"/>
           <p:cNvSpPr>
             <a:spLocks noGrp="1" noRot="1" noChangeAspect="1"/>
           </p:cNvSpPr>
@@ -8147,7 +8146,7 @@
       </p:sp>
       <p:sp>
         <p:nvSpPr>
-          <p:cNvPr id="3" name="Заметки 2"/>
+          <p:cNvPr id="3" name="Notes Placeholder 2"/>
           <p:cNvSpPr>
             <a:spLocks noGrp="1"/>
           </p:cNvSpPr>
@@ -8157,18 +8156,16 @@
         </p:nvSpPr>
         <p:spPr/>
         <p:txBody>
-          <a:bodyPr>
-            <a:normAutofit/>
-          </a:bodyPr>
+          <a:bodyPr/>
           <a:lstStyle/>
           <a:p>
-            <a:endParaRPr lang="ru-RU" sz="1200" dirty="0"/>
+            <a:endParaRPr lang="en-US" dirty="0"/>
           </a:p>
         </p:txBody>
       </p:sp>
       <p:sp>
         <p:nvSpPr>
-          <p:cNvPr id="4" name="Номер слайда 3"/>
+          <p:cNvPr id="4" name="Slide Number Placeholder 3"/>
           <p:cNvSpPr>
             <a:spLocks noGrp="1"/>
           </p:cNvSpPr>
@@ -8193,7 +8190,7 @@
     </p:spTree>
     <p:extLst>
       <p:ext uri="{BB962C8B-B14F-4D97-AF65-F5344CB8AC3E}">
-        <p14:creationId xmlns:p14="http://schemas.microsoft.com/office/powerpoint/2010/main" val="1723964919"/>
+        <p14:creationId xmlns:p14="http://schemas.microsoft.com/office/powerpoint/2010/main" val="2409838804"/>
       </p:ext>
     </p:extLst>
   </p:cSld>
@@ -8281,91 +8278,6 @@
     <p:extLst>
       <p:ext uri="{BB962C8B-B14F-4D97-AF65-F5344CB8AC3E}">
         <p14:creationId xmlns:p14="http://schemas.microsoft.com/office/powerpoint/2010/main" val="958787894"/>
-      </p:ext>
-    </p:extLst>
-  </p:cSld>
-  <p:clrMapOvr>
-    <a:masterClrMapping/>
-  </p:clrMapOvr>
-</p:notes>
-</file>
-
-<file path=ppt/notesSlides/notesSlide30.xml><?xml version="1.0" encoding="utf-8"?>
-<p:notes xmlns:a="http://schemas.openxmlformats.org/drawingml/2006/main" xmlns:r="http://schemas.openxmlformats.org/officeDocument/2006/relationships" xmlns:p="http://schemas.openxmlformats.org/presentationml/2006/main">
-  <p:cSld>
-    <p:spTree>
-      <p:nvGrpSpPr>
-        <p:cNvPr id="1" name=""/>
-        <p:cNvGrpSpPr/>
-        <p:nvPr/>
-      </p:nvGrpSpPr>
-      <p:grpSpPr>
-        <a:xfrm>
-          <a:off x="0" y="0"/>
-          <a:ext cx="0" cy="0"/>
-          <a:chOff x="0" y="0"/>
-          <a:chExt cx="0" cy="0"/>
-        </a:xfrm>
-      </p:grpSpPr>
-      <p:sp>
-        <p:nvSpPr>
-          <p:cNvPr id="2" name="Slide Image Placeholder 1"/>
-          <p:cNvSpPr>
-            <a:spLocks noGrp="1" noRot="1" noChangeAspect="1"/>
-          </p:cNvSpPr>
-          <p:nvPr>
-            <p:ph type="sldImg"/>
-          </p:nvPr>
-        </p:nvSpPr>
-        <p:spPr/>
-      </p:sp>
-      <p:sp>
-        <p:nvSpPr>
-          <p:cNvPr id="3" name="Notes Placeholder 2"/>
-          <p:cNvSpPr>
-            <a:spLocks noGrp="1"/>
-          </p:cNvSpPr>
-          <p:nvPr>
-            <p:ph type="body" idx="1"/>
-          </p:nvPr>
-        </p:nvSpPr>
-        <p:spPr/>
-        <p:txBody>
-          <a:bodyPr/>
-          <a:lstStyle/>
-          <a:p>
-            <a:endParaRPr lang="en-US" dirty="0"/>
-          </a:p>
-        </p:txBody>
-      </p:sp>
-      <p:sp>
-        <p:nvSpPr>
-          <p:cNvPr id="4" name="Slide Number Placeholder 3"/>
-          <p:cNvSpPr>
-            <a:spLocks noGrp="1"/>
-          </p:cNvSpPr>
-          <p:nvPr>
-            <p:ph type="sldNum" sz="quarter" idx="10"/>
-          </p:nvPr>
-        </p:nvSpPr>
-        <p:spPr/>
-        <p:txBody>
-          <a:bodyPr/>
-          <a:lstStyle/>
-          <a:p>
-            <a:fld id="{0AA64A5F-1A9B-4C99-97D2-09882A049204}" type="slidenum">
-              <a:rPr lang="ru-RU" smtClean="0"/>
-              <a:pPr/>
-              <a:t>37</a:t>
-            </a:fld>
-            <a:endParaRPr lang="ru-RU"/>
-          </a:p>
-        </p:txBody>
-      </p:sp>
-    </p:spTree>
-    <p:extLst>
-      <p:ext uri="{BB962C8B-B14F-4D97-AF65-F5344CB8AC3E}">
-        <p14:creationId xmlns:p14="http://schemas.microsoft.com/office/powerpoint/2010/main" val="2409838804"/>
       </p:ext>
     </p:extLst>
   </p:cSld>
@@ -10879,11 +10791,7 @@
           <a:p>
             <a:r>
               <a:rPr lang="en-US" dirty="0" smtClean="0"/>
-              <a:t>PAGE </a:t>
-            </a:r>
-            <a:r>
-              <a:rPr lang="en-US" dirty="0" smtClean="0"/>
-              <a:t>ELEMENTS</a:t>
+              <a:t>PAGE ELEMENTS</a:t>
             </a:r>
             <a:r>
               <a:rPr lang="ru-RU" dirty="0" smtClean="0"/>
@@ -13329,1173 +13237,6 @@
                   <a:schemeClr val="bg1"/>
                 </a:solidFill>
               </a:rPr>
-              <a:t>PAGE ELEMENTS</a:t>
-            </a:r>
-            <a:endParaRPr lang="ru-RU" dirty="0">
-              <a:solidFill>
-                <a:schemeClr val="bg1"/>
-              </a:solidFill>
-            </a:endParaRPr>
-          </a:p>
-        </p:txBody>
-      </p:sp>
-      <p:pic>
-        <p:nvPicPr>
-          <p:cNvPr id="7" name="Picture 6" descr="EPAM_LOGO_gray_blue.png"/>
-          <p:cNvPicPr>
-            <a:picLocks noChangeAspect="1"/>
-          </p:cNvPicPr>
-          <p:nvPr/>
-        </p:nvPicPr>
-        <p:blipFill>
-          <a:blip r:embed="rId3" cstate="print">
-            <a:extLst>
-              <a:ext uri="{28A0092B-C50C-407E-A947-70E740481C1C}">
-                <a14:useLocalDpi xmlns:a14="http://schemas.microsoft.com/office/drawing/2010/main" val="0"/>
-              </a:ext>
-            </a:extLst>
-          </a:blip>
-          <a:stretch>
-            <a:fillRect/>
-          </a:stretch>
-        </p:blipFill>
-        <p:spPr>
-          <a:xfrm>
-            <a:off x="10258632" y="118371"/>
-            <a:ext cx="1669791" cy="654144"/>
-          </a:xfrm>
-          <a:prstGeom prst="rect">
-            <a:avLst/>
-          </a:prstGeom>
-        </p:spPr>
-      </p:pic>
-      <p:grpSp>
-        <p:nvGrpSpPr>
-          <p:cNvPr id="22" name="Group 21"/>
-          <p:cNvGrpSpPr/>
-          <p:nvPr/>
-        </p:nvGrpSpPr>
-        <p:grpSpPr>
-          <a:xfrm>
-            <a:off x="423643" y="1302088"/>
-            <a:ext cx="3945158" cy="1809813"/>
-            <a:chOff x="4003" y="-221666"/>
-            <a:chExt cx="8191113" cy="1809813"/>
-          </a:xfrm>
-        </p:grpSpPr>
-        <p:sp>
-          <p:nvSpPr>
-            <p:cNvPr id="26" name="Rectangle 25"/>
-            <p:cNvSpPr/>
-            <p:nvPr/>
-          </p:nvSpPr>
-          <p:spPr>
-            <a:xfrm>
-              <a:off x="4003" y="-221666"/>
-              <a:ext cx="8191113" cy="1809813"/>
-            </a:xfrm>
-            <a:prstGeom prst="rect">
-              <a:avLst/>
-            </a:prstGeom>
-          </p:spPr>
-          <p:style>
-            <a:lnRef idx="2">
-              <a:schemeClr val="accent3">
-                <a:hueOff val="0"/>
-                <a:satOff val="0"/>
-                <a:lumOff val="0"/>
-                <a:alphaOff val="0"/>
-              </a:schemeClr>
-            </a:lnRef>
-            <a:fillRef idx="1">
-              <a:schemeClr val="accent3">
-                <a:hueOff val="0"/>
-                <a:satOff val="0"/>
-                <a:lumOff val="0"/>
-                <a:alphaOff val="0"/>
-              </a:schemeClr>
-            </a:fillRef>
-            <a:effectRef idx="0">
-              <a:schemeClr val="accent3">
-                <a:hueOff val="0"/>
-                <a:satOff val="0"/>
-                <a:lumOff val="0"/>
-                <a:alphaOff val="0"/>
-              </a:schemeClr>
-            </a:effectRef>
-            <a:fontRef idx="minor">
-              <a:schemeClr val="lt1"/>
-            </a:fontRef>
-          </p:style>
-        </p:sp>
-        <p:sp>
-          <p:nvSpPr>
-            <p:cNvPr id="27" name="TextBox 26"/>
-            <p:cNvSpPr txBox="1"/>
-            <p:nvPr/>
-          </p:nvSpPr>
-          <p:spPr>
-            <a:xfrm>
-              <a:off x="4003" y="-221666"/>
-              <a:ext cx="8191113" cy="1809813"/>
-            </a:xfrm>
-            <a:prstGeom prst="rect">
-              <a:avLst/>
-            </a:prstGeom>
-          </p:spPr>
-          <p:style>
-            <a:lnRef idx="0">
-              <a:scrgbClr r="0" g="0" b="0"/>
-            </a:lnRef>
-            <a:fillRef idx="0">
-              <a:scrgbClr r="0" g="0" b="0"/>
-            </a:fillRef>
-            <a:effectRef idx="0">
-              <a:scrgbClr r="0" g="0" b="0"/>
-            </a:effectRef>
-            <a:fontRef idx="minor">
-              <a:schemeClr val="lt1"/>
-            </a:fontRef>
-          </p:style>
-          <p:txBody>
-            <a:bodyPr spcFirstLastPara="0" vert="horz" wrap="square" lIns="199136" tIns="113792" rIns="199136" bIns="113792" numCol="1" spcCol="1270" anchor="ctr" anchorCtr="0">
-              <a:noAutofit/>
-            </a:bodyPr>
-            <a:lstStyle/>
-            <a:p>
-              <a:pPr lvl="0" algn="l" defTabSz="1244600">
-                <a:lnSpc>
-                  <a:spcPct val="90000"/>
-                </a:lnSpc>
-                <a:spcBef>
-                  <a:spcPct val="0"/>
-                </a:spcBef>
-                <a:spcAft>
-                  <a:spcPct val="35000"/>
-                </a:spcAft>
-              </a:pPr>
-              <a:r>
-                <a:rPr lang="en-US" sz="2800" b="1" kern="1200" dirty="0" smtClean="0"/>
-                <a:t>ELEMENTS</a:t>
-              </a:r>
-              <a:endParaRPr lang="en-US" sz="4300" b="1" kern="1200" dirty="0" smtClean="0"/>
-            </a:p>
-            <a:p>
-              <a:pPr lvl="0" defTabSz="1244600">
-                <a:lnSpc>
-                  <a:spcPct val="90000"/>
-                </a:lnSpc>
-                <a:spcBef>
-                  <a:spcPct val="0"/>
-                </a:spcBef>
-                <a:spcAft>
-                  <a:spcPct val="35000"/>
-                </a:spcAft>
-              </a:pPr>
-              <a:r>
-                <a:rPr lang="en-US" sz="2400" b="1" kern="1200" dirty="0" smtClean="0">
-                  <a:solidFill>
-                    <a:srgbClr val="FF0000"/>
-                  </a:solidFill>
-                </a:rPr>
-                <a:t>public</a:t>
-              </a:r>
-              <a:r>
-                <a:rPr lang="en-US" sz="2400" kern="1200" dirty="0" smtClean="0"/>
-                <a:t> </a:t>
-              </a:r>
-              <a:r>
-                <a:rPr lang="en-US" sz="2400" b="1" kern="1200" dirty="0" err="1" smtClean="0">
-                  <a:solidFill>
-                    <a:srgbClr val="7030A0"/>
-                  </a:solidFill>
-                </a:rPr>
-                <a:t>TextField</a:t>
-              </a:r>
-              <a:r>
-                <a:rPr lang="en-US" sz="2400" kern="1200" dirty="0" smtClean="0"/>
-                <a:t> </a:t>
-              </a:r>
-              <a:r>
-                <a:rPr lang="en-US" sz="2400" kern="1200" dirty="0" err="1" smtClean="0"/>
-                <a:t>UserName</a:t>
-              </a:r>
-              <a:r>
-                <a:rPr lang="en-US" sz="2400" kern="1200" dirty="0" smtClean="0"/>
-                <a:t>;</a:t>
-              </a:r>
-              <a:br>
-                <a:rPr lang="en-US" sz="2400" kern="1200" dirty="0" smtClean="0"/>
-              </a:br>
-              <a:r>
-                <a:rPr lang="en-US" sz="2400" b="1" dirty="0">
-                  <a:solidFill>
-                    <a:srgbClr val="FF0000"/>
-                  </a:solidFill>
-                </a:rPr>
-                <a:t>public</a:t>
-              </a:r>
-              <a:r>
-                <a:rPr lang="en-US" sz="2400" kern="1200" dirty="0" smtClean="0"/>
-                <a:t> </a:t>
-              </a:r>
-              <a:r>
-                <a:rPr lang="en-US" sz="2400" b="1" dirty="0" err="1">
-                  <a:solidFill>
-                    <a:srgbClr val="7030A0"/>
-                  </a:solidFill>
-                </a:rPr>
-                <a:t>TextField</a:t>
-              </a:r>
-              <a:r>
-                <a:rPr lang="en-US" sz="2400" kern="1200" dirty="0" smtClean="0"/>
-                <a:t> Password;</a:t>
-              </a:r>
-              <a:br>
-                <a:rPr lang="en-US" sz="2400" kern="1200" dirty="0" smtClean="0"/>
-              </a:br>
-              <a:r>
-                <a:rPr lang="en-US" sz="2400" b="1" dirty="0">
-                  <a:solidFill>
-                    <a:srgbClr val="FF0000"/>
-                  </a:solidFill>
-                </a:rPr>
-                <a:t>public</a:t>
-              </a:r>
-              <a:r>
-                <a:rPr lang="en-US" sz="2400" kern="1200" dirty="0" smtClean="0"/>
-                <a:t> </a:t>
-              </a:r>
-              <a:r>
-                <a:rPr lang="en-US" sz="2400" b="1" kern="1200" dirty="0" smtClean="0">
-                  <a:solidFill>
-                    <a:srgbClr val="7030A0"/>
-                  </a:solidFill>
-                </a:rPr>
-                <a:t>Button</a:t>
-              </a:r>
-              <a:r>
-                <a:rPr lang="en-US" sz="2400" kern="1200" dirty="0" smtClean="0"/>
-                <a:t> </a:t>
-              </a:r>
-              <a:r>
-                <a:rPr lang="en-US" sz="2400" kern="1200" dirty="0" err="1" smtClean="0"/>
-                <a:t>LoginButton</a:t>
-              </a:r>
-              <a:r>
-                <a:rPr lang="en-US" sz="2400" kern="1200" dirty="0" smtClean="0"/>
-                <a:t>;</a:t>
-              </a:r>
-              <a:endParaRPr lang="en-US" sz="2400" kern="1200" dirty="0"/>
-            </a:p>
-          </p:txBody>
-        </p:sp>
-      </p:grpSp>
-      <p:grpSp>
-        <p:nvGrpSpPr>
-          <p:cNvPr id="23" name="Group 22"/>
-          <p:cNvGrpSpPr/>
-          <p:nvPr/>
-        </p:nvGrpSpPr>
-        <p:grpSpPr>
-          <a:xfrm>
-            <a:off x="419640" y="3111900"/>
-            <a:ext cx="3953164" cy="1114660"/>
-            <a:chOff x="-8616" y="1588144"/>
-            <a:chExt cx="8207735" cy="1976401"/>
-          </a:xfrm>
-        </p:grpSpPr>
-        <p:sp>
-          <p:nvSpPr>
-            <p:cNvPr id="24" name="Rectangle 23"/>
-            <p:cNvSpPr/>
-            <p:nvPr/>
-          </p:nvSpPr>
-          <p:spPr>
-            <a:xfrm>
-              <a:off x="8006" y="1588146"/>
-              <a:ext cx="8191113" cy="1976399"/>
-            </a:xfrm>
-            <a:prstGeom prst="rect">
-              <a:avLst/>
-            </a:prstGeom>
-          </p:spPr>
-          <p:style>
-            <a:lnRef idx="2">
-              <a:schemeClr val="accent3">
-                <a:tint val="40000"/>
-                <a:alpha val="90000"/>
-                <a:hueOff val="0"/>
-                <a:satOff val="0"/>
-                <a:lumOff val="0"/>
-                <a:alphaOff val="0"/>
-              </a:schemeClr>
-            </a:lnRef>
-            <a:fillRef idx="1">
-              <a:schemeClr val="accent3">
-                <a:tint val="40000"/>
-                <a:alpha val="90000"/>
-                <a:hueOff val="0"/>
-                <a:satOff val="0"/>
-                <a:lumOff val="0"/>
-                <a:alphaOff val="0"/>
-              </a:schemeClr>
-            </a:fillRef>
-            <a:effectRef idx="0">
-              <a:schemeClr val="accent3">
-                <a:tint val="40000"/>
-                <a:alpha val="90000"/>
-                <a:hueOff val="0"/>
-                <a:satOff val="0"/>
-                <a:lumOff val="0"/>
-                <a:alphaOff val="0"/>
-              </a:schemeClr>
-            </a:effectRef>
-            <a:fontRef idx="minor">
-              <a:schemeClr val="dk1">
-                <a:hueOff val="0"/>
-                <a:satOff val="0"/>
-                <a:lumOff val="0"/>
-                <a:alphaOff val="0"/>
-              </a:schemeClr>
-            </a:fontRef>
-          </p:style>
-        </p:sp>
-        <p:sp>
-          <p:nvSpPr>
-            <p:cNvPr id="25" name="TextBox 24"/>
-            <p:cNvSpPr txBox="1"/>
-            <p:nvPr/>
-          </p:nvSpPr>
-          <p:spPr>
-            <a:xfrm>
-              <a:off x="-8616" y="1588144"/>
-              <a:ext cx="8191113" cy="1976399"/>
-            </a:xfrm>
-            <a:prstGeom prst="rect">
-              <a:avLst/>
-            </a:prstGeom>
-          </p:spPr>
-          <p:style>
-            <a:lnRef idx="0">
-              <a:scrgbClr r="0" g="0" b="0"/>
-            </a:lnRef>
-            <a:fillRef idx="0">
-              <a:scrgbClr r="0" g="0" b="0"/>
-            </a:fillRef>
-            <a:effectRef idx="0">
-              <a:scrgbClr r="0" g="0" b="0"/>
-            </a:effectRef>
-            <a:fontRef idx="minor">
-              <a:schemeClr val="dk1">
-                <a:hueOff val="0"/>
-                <a:satOff val="0"/>
-                <a:lumOff val="0"/>
-                <a:alphaOff val="0"/>
-              </a:schemeClr>
-            </a:fontRef>
-          </p:style>
-          <p:txBody>
-            <a:bodyPr spcFirstLastPara="0" vert="horz" wrap="square" lIns="149352" tIns="149352" rIns="199136" bIns="224028" numCol="1" spcCol="1270" anchor="t" anchorCtr="0">
-              <a:noAutofit/>
-            </a:bodyPr>
-            <a:lstStyle/>
-            <a:p>
-              <a:pPr marL="285750" lvl="1" indent="-285750" algn="l" defTabSz="1244600">
-                <a:lnSpc>
-                  <a:spcPct val="90000"/>
-                </a:lnSpc>
-                <a:spcBef>
-                  <a:spcPct val="0"/>
-                </a:spcBef>
-                <a:spcAft>
-                  <a:spcPct val="15000"/>
-                </a:spcAft>
-                <a:buChar char="••"/>
-              </a:pPr>
-              <a:r>
-                <a:rPr lang="en-US" sz="2800" b="1" kern="1200" dirty="0" smtClean="0"/>
-                <a:t>ACTIONS</a:t>
-              </a:r>
-              <a:endParaRPr lang="en-US" sz="3300" kern="1200" dirty="0"/>
-            </a:p>
-            <a:p>
-              <a:pPr marL="228600" lvl="1" indent="-228600" algn="l" defTabSz="1066800">
-                <a:lnSpc>
-                  <a:spcPct val="90000"/>
-                </a:lnSpc>
-                <a:spcBef>
-                  <a:spcPct val="0"/>
-                </a:spcBef>
-                <a:spcAft>
-                  <a:spcPct val="15000"/>
-                </a:spcAft>
-                <a:buChar char="••"/>
-              </a:pPr>
-              <a:r>
-                <a:rPr lang="en-US" sz="2400" dirty="0" smtClean="0"/>
-                <a:t>---</a:t>
-              </a:r>
-              <a:endParaRPr lang="en-US" sz="2400" kern="1200" dirty="0"/>
-            </a:p>
-          </p:txBody>
-        </p:sp>
-      </p:grpSp>
-      <p:grpSp>
-        <p:nvGrpSpPr>
-          <p:cNvPr id="31" name="Group 30"/>
-          <p:cNvGrpSpPr/>
-          <p:nvPr/>
-        </p:nvGrpSpPr>
-        <p:grpSpPr>
-          <a:xfrm>
-            <a:off x="423643" y="4226560"/>
-            <a:ext cx="3945158" cy="1114659"/>
-            <a:chOff x="8006" y="1588146"/>
-            <a:chExt cx="8191113" cy="1976399"/>
-          </a:xfrm>
-        </p:grpSpPr>
-        <p:sp>
-          <p:nvSpPr>
-            <p:cNvPr id="32" name="Rectangle 31"/>
-            <p:cNvSpPr/>
-            <p:nvPr/>
-          </p:nvSpPr>
-          <p:spPr>
-            <a:xfrm>
-              <a:off x="8006" y="1588146"/>
-              <a:ext cx="8191113" cy="1976399"/>
-            </a:xfrm>
-            <a:prstGeom prst="rect">
-              <a:avLst/>
-            </a:prstGeom>
-          </p:spPr>
-          <p:style>
-            <a:lnRef idx="2">
-              <a:schemeClr val="accent3">
-                <a:tint val="40000"/>
-                <a:alpha val="90000"/>
-                <a:hueOff val="0"/>
-                <a:satOff val="0"/>
-                <a:lumOff val="0"/>
-                <a:alphaOff val="0"/>
-              </a:schemeClr>
-            </a:lnRef>
-            <a:fillRef idx="1">
-              <a:schemeClr val="accent3">
-                <a:tint val="40000"/>
-                <a:alpha val="90000"/>
-                <a:hueOff val="0"/>
-                <a:satOff val="0"/>
-                <a:lumOff val="0"/>
-                <a:alphaOff val="0"/>
-              </a:schemeClr>
-            </a:fillRef>
-            <a:effectRef idx="0">
-              <a:schemeClr val="accent3">
-                <a:tint val="40000"/>
-                <a:alpha val="90000"/>
-                <a:hueOff val="0"/>
-                <a:satOff val="0"/>
-                <a:lumOff val="0"/>
-                <a:alphaOff val="0"/>
-              </a:schemeClr>
-            </a:effectRef>
-            <a:fontRef idx="minor">
-              <a:schemeClr val="dk1">
-                <a:hueOff val="0"/>
-                <a:satOff val="0"/>
-                <a:lumOff val="0"/>
-                <a:alphaOff val="0"/>
-              </a:schemeClr>
-            </a:fontRef>
-          </p:style>
-        </p:sp>
-        <p:sp>
-          <p:nvSpPr>
-            <p:cNvPr id="33" name="TextBox 32"/>
-            <p:cNvSpPr txBox="1"/>
-            <p:nvPr/>
-          </p:nvSpPr>
-          <p:spPr>
-            <a:xfrm>
-              <a:off x="8006" y="1588146"/>
-              <a:ext cx="8191113" cy="1976399"/>
-            </a:xfrm>
-            <a:prstGeom prst="rect">
-              <a:avLst/>
-            </a:prstGeom>
-          </p:spPr>
-          <p:style>
-            <a:lnRef idx="0">
-              <a:scrgbClr r="0" g="0" b="0"/>
-            </a:lnRef>
-            <a:fillRef idx="0">
-              <a:scrgbClr r="0" g="0" b="0"/>
-            </a:fillRef>
-            <a:effectRef idx="0">
-              <a:scrgbClr r="0" g="0" b="0"/>
-            </a:effectRef>
-            <a:fontRef idx="minor">
-              <a:schemeClr val="dk1">
-                <a:hueOff val="0"/>
-                <a:satOff val="0"/>
-                <a:lumOff val="0"/>
-                <a:alphaOff val="0"/>
-              </a:schemeClr>
-            </a:fontRef>
-          </p:style>
-          <p:txBody>
-            <a:bodyPr spcFirstLastPara="0" vert="horz" wrap="square" lIns="149352" tIns="149352" rIns="199136" bIns="224028" numCol="1" spcCol="1270" anchor="t" anchorCtr="0">
-              <a:noAutofit/>
-            </a:bodyPr>
-            <a:lstStyle/>
-            <a:p>
-              <a:pPr marL="285750" lvl="1" indent="-285750" algn="l" defTabSz="1244600">
-                <a:lnSpc>
-                  <a:spcPct val="90000"/>
-                </a:lnSpc>
-                <a:spcBef>
-                  <a:spcPct val="0"/>
-                </a:spcBef>
-                <a:spcAft>
-                  <a:spcPct val="15000"/>
-                </a:spcAft>
-                <a:buChar char="••"/>
-              </a:pPr>
-              <a:r>
-                <a:rPr lang="en-US" sz="2800" b="1" kern="1200" dirty="0" smtClean="0"/>
-                <a:t>BUSINESS ACTIONS</a:t>
-              </a:r>
-              <a:endParaRPr lang="en-US" sz="3300" kern="1200" dirty="0"/>
-            </a:p>
-            <a:p>
-              <a:pPr marL="228600" lvl="1" indent="-228600" algn="l" defTabSz="1066800">
-                <a:lnSpc>
-                  <a:spcPct val="90000"/>
-                </a:lnSpc>
-                <a:spcBef>
-                  <a:spcPct val="0"/>
-                </a:spcBef>
-                <a:spcAft>
-                  <a:spcPct val="15000"/>
-                </a:spcAft>
-                <a:buChar char="••"/>
-              </a:pPr>
-              <a:r>
-                <a:rPr lang="en-US" sz="2400" kern="1200" dirty="0" smtClean="0"/>
-                <a:t>Login(User user)</a:t>
-              </a:r>
-              <a:endParaRPr lang="en-US" sz="2400" kern="1200" dirty="0"/>
-            </a:p>
-          </p:txBody>
-        </p:sp>
-      </p:grpSp>
-      <p:grpSp>
-        <p:nvGrpSpPr>
-          <p:cNvPr id="49" name="Group 48"/>
-          <p:cNvGrpSpPr/>
-          <p:nvPr/>
-        </p:nvGrpSpPr>
-        <p:grpSpPr>
-          <a:xfrm>
-            <a:off x="4858686" y="1310197"/>
-            <a:ext cx="4112875" cy="1179003"/>
-            <a:chOff x="4003" y="-221666"/>
-            <a:chExt cx="8191113" cy="1809813"/>
-          </a:xfrm>
-        </p:grpSpPr>
-        <p:sp>
-          <p:nvSpPr>
-            <p:cNvPr id="50" name="Rectangle 49"/>
-            <p:cNvSpPr/>
-            <p:nvPr/>
-          </p:nvSpPr>
-          <p:spPr>
-            <a:xfrm>
-              <a:off x="4003" y="-221666"/>
-              <a:ext cx="8191113" cy="1809813"/>
-            </a:xfrm>
-            <a:prstGeom prst="rect">
-              <a:avLst/>
-            </a:prstGeom>
-          </p:spPr>
-          <p:style>
-            <a:lnRef idx="2">
-              <a:schemeClr val="accent3">
-                <a:hueOff val="0"/>
-                <a:satOff val="0"/>
-                <a:lumOff val="0"/>
-                <a:alphaOff val="0"/>
-              </a:schemeClr>
-            </a:lnRef>
-            <a:fillRef idx="1">
-              <a:schemeClr val="accent3">
-                <a:hueOff val="0"/>
-                <a:satOff val="0"/>
-                <a:lumOff val="0"/>
-                <a:alphaOff val="0"/>
-              </a:schemeClr>
-            </a:fillRef>
-            <a:effectRef idx="0">
-              <a:schemeClr val="accent3">
-                <a:hueOff val="0"/>
-                <a:satOff val="0"/>
-                <a:lumOff val="0"/>
-                <a:alphaOff val="0"/>
-              </a:schemeClr>
-            </a:effectRef>
-            <a:fontRef idx="minor">
-              <a:schemeClr val="lt1"/>
-            </a:fontRef>
-          </p:style>
-        </p:sp>
-        <p:sp>
-          <p:nvSpPr>
-            <p:cNvPr id="51" name="TextBox 50"/>
-            <p:cNvSpPr txBox="1"/>
-            <p:nvPr/>
-          </p:nvSpPr>
-          <p:spPr>
-            <a:xfrm>
-              <a:off x="4003" y="-221666"/>
-              <a:ext cx="8191113" cy="1524443"/>
-            </a:xfrm>
-            <a:prstGeom prst="rect">
-              <a:avLst/>
-            </a:prstGeom>
-          </p:spPr>
-          <p:style>
-            <a:lnRef idx="0">
-              <a:scrgbClr r="0" g="0" b="0"/>
-            </a:lnRef>
-            <a:fillRef idx="0">
-              <a:scrgbClr r="0" g="0" b="0"/>
-            </a:fillRef>
-            <a:effectRef idx="0">
-              <a:scrgbClr r="0" g="0" b="0"/>
-            </a:effectRef>
-            <a:fontRef idx="minor">
-              <a:schemeClr val="lt1"/>
-            </a:fontRef>
-          </p:style>
-          <p:txBody>
-            <a:bodyPr spcFirstLastPara="0" vert="horz" wrap="square" lIns="199136" tIns="113792" rIns="199136" bIns="113792" numCol="1" spcCol="1270" anchor="ctr" anchorCtr="0">
-              <a:noAutofit/>
-            </a:bodyPr>
-            <a:lstStyle/>
-            <a:p>
-              <a:pPr lvl="0" algn="l" defTabSz="1244600">
-                <a:lnSpc>
-                  <a:spcPct val="90000"/>
-                </a:lnSpc>
-                <a:spcBef>
-                  <a:spcPct val="0"/>
-                </a:spcBef>
-                <a:spcAft>
-                  <a:spcPct val="35000"/>
-                </a:spcAft>
-              </a:pPr>
-              <a:r>
-                <a:rPr lang="en-US" sz="2800" b="1" kern="1200" dirty="0" smtClean="0"/>
-                <a:t>ELEMENT</a:t>
-              </a:r>
-              <a:endParaRPr lang="en-US" sz="4300" b="1" kern="1200" dirty="0" smtClean="0"/>
-            </a:p>
-            <a:p>
-              <a:pPr lvl="0" defTabSz="1244600">
-                <a:lnSpc>
-                  <a:spcPct val="90000"/>
-                </a:lnSpc>
-                <a:spcBef>
-                  <a:spcPct val="0"/>
-                </a:spcBef>
-                <a:spcAft>
-                  <a:spcPct val="35000"/>
-                </a:spcAft>
-              </a:pPr>
-              <a:r>
-                <a:rPr lang="en-US" sz="2400" b="1" kern="1200" dirty="0" smtClean="0">
-                  <a:solidFill>
-                    <a:srgbClr val="FF0000"/>
-                  </a:solidFill>
-                </a:rPr>
-                <a:t>public</a:t>
-              </a:r>
-              <a:r>
-                <a:rPr lang="en-US" sz="2400" kern="1200" dirty="0" smtClean="0"/>
-                <a:t> </a:t>
-              </a:r>
-              <a:r>
-                <a:rPr lang="en-US" sz="2400" b="1" kern="1200" dirty="0" err="1" smtClean="0">
-                  <a:solidFill>
-                    <a:srgbClr val="7030A0"/>
-                  </a:solidFill>
-                </a:rPr>
-                <a:t>DropDown</a:t>
-              </a:r>
-              <a:r>
-                <a:rPr lang="en-US" sz="2400" kern="1200" dirty="0" smtClean="0"/>
-                <a:t> </a:t>
-              </a:r>
-              <a:r>
-                <a:rPr lang="en-US" sz="2400" kern="1200" dirty="0" err="1" smtClean="0"/>
-                <a:t>UserStatus</a:t>
-              </a:r>
-              <a:r>
-                <a:rPr lang="en-US" sz="2400" kern="1200" dirty="0" smtClean="0"/>
-                <a:t>;</a:t>
-              </a:r>
-              <a:endParaRPr lang="en-US" sz="2400" kern="1200" dirty="0"/>
-            </a:p>
-          </p:txBody>
-        </p:sp>
-      </p:grpSp>
-      <p:grpSp>
-        <p:nvGrpSpPr>
-          <p:cNvPr id="52" name="Group 51"/>
-          <p:cNvGrpSpPr/>
-          <p:nvPr/>
-        </p:nvGrpSpPr>
-        <p:grpSpPr>
-          <a:xfrm>
-            <a:off x="4858686" y="2489200"/>
-            <a:ext cx="4112594" cy="2316480"/>
-            <a:chOff x="-635" y="1588144"/>
-            <a:chExt cx="8199754" cy="1976401"/>
-          </a:xfrm>
-        </p:grpSpPr>
-        <p:sp>
-          <p:nvSpPr>
-            <p:cNvPr id="53" name="Rectangle 52"/>
-            <p:cNvSpPr/>
-            <p:nvPr/>
-          </p:nvSpPr>
-          <p:spPr>
-            <a:xfrm>
-              <a:off x="8006" y="1588146"/>
-              <a:ext cx="8191113" cy="1976399"/>
-            </a:xfrm>
-            <a:prstGeom prst="rect">
-              <a:avLst/>
-            </a:prstGeom>
-          </p:spPr>
-          <p:style>
-            <a:lnRef idx="2">
-              <a:schemeClr val="accent3">
-                <a:tint val="40000"/>
-                <a:alpha val="90000"/>
-                <a:hueOff val="0"/>
-                <a:satOff val="0"/>
-                <a:lumOff val="0"/>
-                <a:alphaOff val="0"/>
-              </a:schemeClr>
-            </a:lnRef>
-            <a:fillRef idx="1">
-              <a:schemeClr val="accent3">
-                <a:tint val="40000"/>
-                <a:alpha val="90000"/>
-                <a:hueOff val="0"/>
-                <a:satOff val="0"/>
-                <a:lumOff val="0"/>
-                <a:alphaOff val="0"/>
-              </a:schemeClr>
-            </a:fillRef>
-            <a:effectRef idx="0">
-              <a:schemeClr val="accent3">
-                <a:tint val="40000"/>
-                <a:alpha val="90000"/>
-                <a:hueOff val="0"/>
-                <a:satOff val="0"/>
-                <a:lumOff val="0"/>
-                <a:alphaOff val="0"/>
-              </a:schemeClr>
-            </a:effectRef>
-            <a:fontRef idx="minor">
-              <a:schemeClr val="dk1">
-                <a:hueOff val="0"/>
-                <a:satOff val="0"/>
-                <a:lumOff val="0"/>
-                <a:alphaOff val="0"/>
-              </a:schemeClr>
-            </a:fontRef>
-          </p:style>
-        </p:sp>
-        <p:sp>
-          <p:nvSpPr>
-            <p:cNvPr id="54" name="TextBox 53"/>
-            <p:cNvSpPr txBox="1"/>
-            <p:nvPr/>
-          </p:nvSpPr>
-          <p:spPr>
-            <a:xfrm>
-              <a:off x="-635" y="1588144"/>
-              <a:ext cx="8191113" cy="1976399"/>
-            </a:xfrm>
-            <a:prstGeom prst="rect">
-              <a:avLst/>
-            </a:prstGeom>
-          </p:spPr>
-          <p:style>
-            <a:lnRef idx="0">
-              <a:scrgbClr r="0" g="0" b="0"/>
-            </a:lnRef>
-            <a:fillRef idx="0">
-              <a:scrgbClr r="0" g="0" b="0"/>
-            </a:fillRef>
-            <a:effectRef idx="0">
-              <a:scrgbClr r="0" g="0" b="0"/>
-            </a:effectRef>
-            <a:fontRef idx="minor">
-              <a:schemeClr val="dk1">
-                <a:hueOff val="0"/>
-                <a:satOff val="0"/>
-                <a:lumOff val="0"/>
-                <a:alphaOff val="0"/>
-              </a:schemeClr>
-            </a:fontRef>
-          </p:style>
-          <p:txBody>
-            <a:bodyPr spcFirstLastPara="0" vert="horz" wrap="square" lIns="149352" tIns="149352" rIns="199136" bIns="224028" numCol="1" spcCol="1270" anchor="t" anchorCtr="0">
-              <a:noAutofit/>
-            </a:bodyPr>
-            <a:lstStyle/>
-            <a:p>
-              <a:pPr marL="285750" lvl="1" indent="-285750" algn="l" defTabSz="1244600">
-                <a:lnSpc>
-                  <a:spcPct val="90000"/>
-                </a:lnSpc>
-                <a:spcBef>
-                  <a:spcPct val="0"/>
-                </a:spcBef>
-                <a:spcAft>
-                  <a:spcPct val="15000"/>
-                </a:spcAft>
-                <a:buChar char="••"/>
-              </a:pPr>
-              <a:r>
-                <a:rPr lang="en-US" sz="2800" b="1" kern="1200" dirty="0" smtClean="0"/>
-                <a:t>ACTIONS</a:t>
-              </a:r>
-            </a:p>
-            <a:p>
-              <a:pPr marL="285750" lvl="1" indent="-285750" algn="l" defTabSz="1244600">
-                <a:lnSpc>
-                  <a:spcPct val="90000"/>
-                </a:lnSpc>
-                <a:spcBef>
-                  <a:spcPct val="0"/>
-                </a:spcBef>
-                <a:spcAft>
-                  <a:spcPct val="15000"/>
-                </a:spcAft>
-                <a:buChar char="••"/>
-              </a:pPr>
-              <a:r>
-                <a:rPr lang="en-US" sz="2400" dirty="0" smtClean="0"/>
-                <a:t>Select(string option)</a:t>
-              </a:r>
-            </a:p>
-            <a:p>
-              <a:pPr marL="285750" lvl="1" indent="-285750" algn="l" defTabSz="1244600">
-                <a:lnSpc>
-                  <a:spcPct val="90000"/>
-                </a:lnSpc>
-                <a:spcBef>
-                  <a:spcPct val="0"/>
-                </a:spcBef>
-                <a:spcAft>
-                  <a:spcPct val="15000"/>
-                </a:spcAft>
-                <a:buChar char="••"/>
-              </a:pPr>
-              <a:r>
-                <a:rPr lang="en-US" sz="2400" dirty="0"/>
-                <a:t>b</a:t>
-              </a:r>
-              <a:r>
-                <a:rPr lang="en-US" sz="2400" kern="1200" dirty="0" smtClean="0"/>
-                <a:t>ool </a:t>
-              </a:r>
-              <a:r>
-                <a:rPr lang="en-US" sz="2400" kern="1200" dirty="0" err="1" smtClean="0"/>
-                <a:t>IsSelcted</a:t>
-              </a:r>
-              <a:r>
-                <a:rPr lang="en-US" sz="2400" dirty="0" smtClean="0"/>
-                <a:t>()</a:t>
-              </a:r>
-            </a:p>
-            <a:p>
-              <a:pPr marL="285750" lvl="1" indent="-285750" algn="l" defTabSz="1244600">
-                <a:lnSpc>
-                  <a:spcPct val="90000"/>
-                </a:lnSpc>
-                <a:spcBef>
-                  <a:spcPct val="0"/>
-                </a:spcBef>
-                <a:spcAft>
-                  <a:spcPct val="15000"/>
-                </a:spcAft>
-                <a:buChar char="••"/>
-              </a:pPr>
-              <a:r>
-                <a:rPr lang="en-US" sz="2400" dirty="0" smtClean="0"/>
-                <a:t>List&lt;string&gt; </a:t>
-              </a:r>
-              <a:r>
-                <a:rPr lang="en-US" sz="2400" dirty="0" err="1" smtClean="0"/>
-                <a:t>AllOptions</a:t>
-              </a:r>
-              <a:r>
-                <a:rPr lang="en-US" sz="2400" dirty="0" smtClean="0"/>
-                <a:t>()</a:t>
-              </a:r>
-            </a:p>
-            <a:p>
-              <a:pPr marL="285750" lvl="1" indent="-285750" algn="l" defTabSz="1244600">
-                <a:lnSpc>
-                  <a:spcPct val="90000"/>
-                </a:lnSpc>
-                <a:spcBef>
-                  <a:spcPct val="0"/>
-                </a:spcBef>
-                <a:spcAft>
-                  <a:spcPct val="15000"/>
-                </a:spcAft>
-                <a:buChar char="••"/>
-              </a:pPr>
-              <a:r>
-                <a:rPr lang="en-US" sz="2400" dirty="0" smtClean="0"/>
-                <a:t>string </a:t>
-              </a:r>
-              <a:r>
-                <a:rPr lang="en-US" sz="2400" dirty="0" err="1" smtClean="0"/>
-                <a:t>Get</a:t>
-              </a:r>
-              <a:r>
-                <a:rPr lang="en-US" sz="2400" kern="1200" dirty="0" err="1" smtClean="0"/>
-                <a:t>Value</a:t>
-              </a:r>
-              <a:r>
-                <a:rPr lang="en-US" sz="2400" kern="1200" dirty="0" smtClean="0"/>
-                <a:t>()</a:t>
-              </a:r>
-              <a:endParaRPr lang="en-US" sz="2000" kern="1200" dirty="0"/>
-            </a:p>
-            <a:p>
-              <a:pPr marL="228600" lvl="1" indent="-228600" algn="l" defTabSz="1066800">
-                <a:lnSpc>
-                  <a:spcPct val="90000"/>
-                </a:lnSpc>
-                <a:spcBef>
-                  <a:spcPct val="0"/>
-                </a:spcBef>
-                <a:spcAft>
-                  <a:spcPct val="15000"/>
-                </a:spcAft>
-                <a:buChar char="••"/>
-              </a:pPr>
-              <a:endParaRPr lang="en-US" sz="2400" kern="1200" dirty="0"/>
-            </a:p>
-          </p:txBody>
-        </p:sp>
-      </p:grpSp>
-      <p:sp>
-        <p:nvSpPr>
-          <p:cNvPr id="2" name="Slide Number Placeholder 1"/>
-          <p:cNvSpPr>
-            <a:spLocks noGrp="1"/>
-          </p:cNvSpPr>
-          <p:nvPr>
-            <p:ph type="sldNum" sz="quarter" idx="4"/>
-          </p:nvPr>
-        </p:nvSpPr>
-        <p:spPr/>
-        <p:txBody>
-          <a:bodyPr/>
-          <a:lstStyle/>
-          <a:p>
-            <a:fld id="{DA896BDD-8C87-40D7-8650-5CFFA3FBC00B}" type="slidenum">
-              <a:rPr lang="en-US" smtClean="0"/>
-              <a:pPr/>
-              <a:t>15</a:t>
-            </a:fld>
-            <a:endParaRPr lang="en-US" dirty="0"/>
-          </a:p>
-        </p:txBody>
-      </p:sp>
-    </p:spTree>
-    <p:extLst>
-      <p:ext uri="{BB962C8B-B14F-4D97-AF65-F5344CB8AC3E}">
-        <p14:creationId xmlns:p14="http://schemas.microsoft.com/office/powerpoint/2010/main" val="3462635986"/>
-      </p:ext>
-    </p:extLst>
-  </p:cSld>
-  <p:clrMapOvr>
-    <a:masterClrMapping/>
-  </p:clrMapOvr>
-  <p:timing>
-    <p:tnLst>
-      <p:par>
-        <p:cTn id="1" dur="indefinite" restart="never" nodeType="tmRoot">
-          <p:childTnLst>
-            <p:seq concurrent="1" nextAc="seek">
-              <p:cTn id="2" dur="indefinite" nodeType="mainSeq">
-                <p:childTnLst>
-                  <p:par>
-                    <p:cTn id="3" fill="hold">
-                      <p:stCondLst>
-                        <p:cond delay="indefinite"/>
-                      </p:stCondLst>
-                      <p:childTnLst>
-                        <p:par>
-                          <p:cTn id="4" fill="hold">
-                            <p:stCondLst>
-                              <p:cond delay="0"/>
-                            </p:stCondLst>
-                            <p:childTnLst>
-                              <p:par>
-                                <p:cTn id="5" presetID="10" presetClass="entr" presetSubtype="0" fill="hold" nodeType="clickEffect">
-                                  <p:stCondLst>
-                                    <p:cond delay="0"/>
-                                  </p:stCondLst>
-                                  <p:childTnLst>
-                                    <p:set>
-                                      <p:cBhvr>
-                                        <p:cTn id="6" dur="1" fill="hold">
-                                          <p:stCondLst>
-                                            <p:cond delay="0"/>
-                                          </p:stCondLst>
-                                        </p:cTn>
-                                        <p:tgtEl>
-                                          <p:spTgt spid="49"/>
-                                        </p:tgtEl>
-                                        <p:attrNameLst>
-                                          <p:attrName>style.visibility</p:attrName>
-                                        </p:attrNameLst>
-                                      </p:cBhvr>
-                                      <p:to>
-                                        <p:strVal val="visible"/>
-                                      </p:to>
-                                    </p:set>
-                                    <p:animEffect transition="in" filter="fade">
-                                      <p:cBhvr>
-                                        <p:cTn id="7" dur="500"/>
-                                        <p:tgtEl>
-                                          <p:spTgt spid="49"/>
-                                        </p:tgtEl>
-                                      </p:cBhvr>
-                                    </p:animEffect>
-                                  </p:childTnLst>
-                                </p:cTn>
-                              </p:par>
-                              <p:par>
-                                <p:cTn id="8" presetID="10" presetClass="entr" presetSubtype="0" fill="hold" nodeType="withEffect">
-                                  <p:stCondLst>
-                                    <p:cond delay="0"/>
-                                  </p:stCondLst>
-                                  <p:childTnLst>
-                                    <p:set>
-                                      <p:cBhvr>
-                                        <p:cTn id="9" dur="1" fill="hold">
-                                          <p:stCondLst>
-                                            <p:cond delay="0"/>
-                                          </p:stCondLst>
-                                        </p:cTn>
-                                        <p:tgtEl>
-                                          <p:spTgt spid="52"/>
-                                        </p:tgtEl>
-                                        <p:attrNameLst>
-                                          <p:attrName>style.visibility</p:attrName>
-                                        </p:attrNameLst>
-                                      </p:cBhvr>
-                                      <p:to>
-                                        <p:strVal val="visible"/>
-                                      </p:to>
-                                    </p:set>
-                                    <p:animEffect transition="in" filter="fade">
-                                      <p:cBhvr>
-                                        <p:cTn id="10" dur="500"/>
-                                        <p:tgtEl>
-                                          <p:spTgt spid="52"/>
-                                        </p:tgtEl>
-                                      </p:cBhvr>
-                                    </p:animEffect>
-                                  </p:childTnLst>
-                                </p:cTn>
-                              </p:par>
-                            </p:childTnLst>
-                          </p:cTn>
-                        </p:par>
-                      </p:childTnLst>
-                    </p:cTn>
-                  </p:par>
-                </p:childTnLst>
-              </p:cTn>
-              <p:prevCondLst>
-                <p:cond evt="onPrev" delay="0">
-                  <p:tgtEl>
-                    <p:sldTgt/>
-                  </p:tgtEl>
-                </p:cond>
-              </p:prevCondLst>
-              <p:nextCondLst>
-                <p:cond evt="onNext" delay="0">
-                  <p:tgtEl>
-                    <p:sldTgt/>
-                  </p:tgtEl>
-                </p:cond>
-              </p:nextCondLst>
-            </p:seq>
-          </p:childTnLst>
-        </p:cTn>
-      </p:par>
-    </p:tnLst>
-  </p:timing>
-</p:sld>
-</file>
-
-<file path=ppt/slides/slide16.xml><?xml version="1.0" encoding="utf-8"?>
-<p:sld xmlns:a="http://schemas.openxmlformats.org/drawingml/2006/main" xmlns:r="http://schemas.openxmlformats.org/officeDocument/2006/relationships" xmlns:p="http://schemas.openxmlformats.org/presentationml/2006/main">
-  <p:cSld>
-    <p:spTree>
-      <p:nvGrpSpPr>
-        <p:cNvPr id="1" name=""/>
-        <p:cNvGrpSpPr/>
-        <p:nvPr/>
-      </p:nvGrpSpPr>
-      <p:grpSpPr>
-        <a:xfrm>
-          <a:off x="0" y="0"/>
-          <a:ext cx="0" cy="0"/>
-          <a:chOff x="0" y="0"/>
-          <a:chExt cx="0" cy="0"/>
-        </a:xfrm>
-      </p:grpSpPr>
-      <p:sp>
-        <p:nvSpPr>
-          <p:cNvPr id="3" name="Текст 2"/>
-          <p:cNvSpPr>
-            <a:spLocks noGrp="1"/>
-          </p:cNvSpPr>
-          <p:nvPr>
-            <p:ph type="body" sz="quarter" idx="13"/>
-          </p:nvPr>
-        </p:nvSpPr>
-        <p:spPr>
-          <a:noFill/>
-        </p:spPr>
-        <p:txBody>
-          <a:bodyPr/>
-          <a:lstStyle/>
-          <a:p>
-            <a:r>
-              <a:rPr lang="en-US" dirty="0" smtClean="0">
-                <a:solidFill>
-                  <a:schemeClr val="bg1"/>
-                </a:solidFill>
-              </a:rPr>
               <a:t>ELEMENTS</a:t>
             </a:r>
             <a:endParaRPr lang="ru-RU" dirty="0">
@@ -14822,7 +13563,7 @@
             <a:fld id="{DA896BDD-8C87-40D7-8650-5CFFA3FBC00B}" type="slidenum">
               <a:rPr lang="en-US" smtClean="0"/>
               <a:pPr/>
-              <a:t>16</a:t>
+              <a:t>15</a:t>
             </a:fld>
             <a:endParaRPr lang="en-US" dirty="0"/>
           </a:p>
@@ -15137,7 +13878,7 @@
 </p:sld>
 </file>
 
-<file path=ppt/slides/slide17.xml><?xml version="1.0" encoding="utf-8"?>
+<file path=ppt/slides/slide16.xml><?xml version="1.0" encoding="utf-8"?>
 <p:sld xmlns:a="http://schemas.openxmlformats.org/drawingml/2006/main" xmlns:r="http://schemas.openxmlformats.org/officeDocument/2006/relationships" xmlns:p="http://schemas.openxmlformats.org/presentationml/2006/main">
   <p:cSld>
     <p:spTree>
@@ -15195,7 +13936,7 @@
             <a:fld id="{DA896BDD-8C87-40D7-8650-5CFFA3FBC00B}" type="slidenum">
               <a:rPr lang="en-US" smtClean="0"/>
               <a:pPr/>
-              <a:t>17</a:t>
+              <a:t>16</a:t>
             </a:fld>
             <a:endParaRPr lang="en-US" dirty="0"/>
           </a:p>
@@ -15221,7 +13962,7 @@
 </p:sld>
 </file>
 
-<file path=ppt/slides/slide18.xml><?xml version="1.0" encoding="utf-8"?>
+<file path=ppt/slides/slide17.xml><?xml version="1.0" encoding="utf-8"?>
 <p:sld xmlns:a="http://schemas.openxmlformats.org/drawingml/2006/main" xmlns:r="http://schemas.openxmlformats.org/officeDocument/2006/relationships" xmlns:p="http://schemas.openxmlformats.org/presentationml/2006/main">
   <p:cSld>
     <p:spTree>
@@ -16047,7 +14788,7 @@
             <a:fld id="{DA896BDD-8C87-40D7-8650-5CFFA3FBC00B}" type="slidenum">
               <a:rPr lang="en-US" smtClean="0"/>
               <a:pPr/>
-              <a:t>18</a:t>
+              <a:t>17</a:t>
             </a:fld>
             <a:endParaRPr lang="en-US" dirty="0"/>
           </a:p>
@@ -16790,7 +15531,7 @@
 </p:sld>
 </file>
 
-<file path=ppt/slides/slide19.xml><?xml version="1.0" encoding="utf-8"?>
+<file path=ppt/slides/slide18.xml><?xml version="1.0" encoding="utf-8"?>
 <p:sld xmlns:a="http://schemas.openxmlformats.org/drawingml/2006/main" xmlns:r="http://schemas.openxmlformats.org/officeDocument/2006/relationships" xmlns:p="http://schemas.openxmlformats.org/presentationml/2006/main">
   <p:cSld>
     <p:spTree>
@@ -17087,7 +15828,7 @@
             <a:fld id="{DA896BDD-8C87-40D7-8650-5CFFA3FBC00B}" type="slidenum">
               <a:rPr lang="en-US" smtClean="0"/>
               <a:pPr/>
-              <a:t>19</a:t>
+              <a:t>18</a:t>
             </a:fld>
             <a:endParaRPr lang="en-US" dirty="0"/>
           </a:p>
@@ -19278,224 +18019,7 @@
 </p:sld>
 </file>
 
-<file path=ppt/slides/slide2.xml><?xml version="1.0" encoding="utf-8"?>
-<p:sld xmlns:a="http://schemas.openxmlformats.org/drawingml/2006/main" xmlns:r="http://schemas.openxmlformats.org/officeDocument/2006/relationships" xmlns:p="http://schemas.openxmlformats.org/presentationml/2006/main">
-  <p:cSld>
-    <p:spTree>
-      <p:nvGrpSpPr>
-        <p:cNvPr id="1" name=""/>
-        <p:cNvGrpSpPr/>
-        <p:nvPr/>
-      </p:nvGrpSpPr>
-      <p:grpSpPr>
-        <a:xfrm>
-          <a:off x="0" y="0"/>
-          <a:ext cx="0" cy="0"/>
-          <a:chOff x="0" y="0"/>
-          <a:chExt cx="0" cy="0"/>
-        </a:xfrm>
-      </p:grpSpPr>
-      <p:sp>
-        <p:nvSpPr>
-          <p:cNvPr id="20" name="Содержимое 19"/>
-          <p:cNvSpPr>
-            <a:spLocks noGrp="1"/>
-          </p:cNvSpPr>
-          <p:nvPr>
-            <p:ph idx="1"/>
-          </p:nvPr>
-        </p:nvSpPr>
-        <p:spPr/>
-        <p:txBody>
-          <a:bodyPr>
-            <a:normAutofit/>
-          </a:bodyPr>
-          <a:lstStyle/>
-          <a:p>
-            <a:r>
-              <a:rPr lang="en-US" sz="4000" b="1" dirty="0">
-                <a:solidFill>
-                  <a:schemeClr val="tx1">
-                    <a:lumMod val="50000"/>
-                  </a:schemeClr>
-                </a:solidFill>
-              </a:rPr>
-              <a:t> UI Objects. JDI</a:t>
-            </a:r>
-          </a:p>
-          <a:p>
-            <a:pPr>
-              <a:buFont typeface="Wingdings" panose="05000000000000000000" pitchFamily="2" charset="2"/>
-              <a:buChar char="Ø"/>
-            </a:pPr>
-            <a:r>
-              <a:rPr lang="en-US" sz="4000" b="1" dirty="0">
-                <a:solidFill>
-                  <a:srgbClr val="00B050"/>
-                </a:solidFill>
-              </a:rPr>
-              <a:t> JDI. Composite elements</a:t>
-            </a:r>
-          </a:p>
-          <a:p>
-            <a:pPr>
-              <a:buFont typeface="Arial" panose="020B0604020202020204" pitchFamily="34" charset="0"/>
-              <a:buChar char="•"/>
-            </a:pPr>
-            <a:r>
-              <a:rPr lang="en-US" sz="4000" b="1" dirty="0" smtClean="0">
-                <a:solidFill>
-                  <a:schemeClr val="tx1">
-                    <a:lumMod val="50000"/>
-                  </a:schemeClr>
-                </a:solidFill>
-              </a:rPr>
-              <a:t> JDI Settings</a:t>
-            </a:r>
-            <a:endParaRPr lang="en-US" sz="4000" b="1" dirty="0">
-              <a:solidFill>
-                <a:schemeClr val="tx1">
-                  <a:lumMod val="50000"/>
-                </a:schemeClr>
-              </a:solidFill>
-            </a:endParaRPr>
-          </a:p>
-          <a:p>
-            <a:pPr>
-              <a:buFont typeface="Arial" panose="020B0604020202020204" pitchFamily="34" charset="0"/>
-              <a:buChar char="•"/>
-            </a:pPr>
-            <a:r>
-              <a:rPr lang="en-US" sz="4000" b="1" dirty="0" smtClean="0">
-                <a:solidFill>
-                  <a:schemeClr val="tx1">
-                    <a:lumMod val="50000"/>
-                  </a:schemeClr>
-                </a:solidFill>
-              </a:rPr>
-              <a:t> JDI for any UI</a:t>
-            </a:r>
-            <a:endParaRPr lang="ru-RU" sz="4000" b="1" dirty="0">
-              <a:solidFill>
-                <a:schemeClr val="tx1">
-                  <a:lumMod val="50000"/>
-                </a:schemeClr>
-              </a:solidFill>
-            </a:endParaRPr>
-          </a:p>
-        </p:txBody>
-      </p:sp>
-      <p:sp>
-        <p:nvSpPr>
-          <p:cNvPr id="2" name="Slide Number Placeholder 1"/>
-          <p:cNvSpPr>
-            <a:spLocks noGrp="1"/>
-          </p:cNvSpPr>
-          <p:nvPr>
-            <p:ph type="sldNum" sz="quarter" idx="4"/>
-          </p:nvPr>
-        </p:nvSpPr>
-        <p:spPr/>
-        <p:txBody>
-          <a:bodyPr/>
-          <a:lstStyle/>
-          <a:p>
-            <a:fld id="{DA896BDD-8C87-40D7-8650-5CFFA3FBC00B}" type="slidenum">
-              <a:rPr lang="en-US" smtClean="0"/>
-              <a:pPr/>
-              <a:t>2</a:t>
-            </a:fld>
-            <a:endParaRPr lang="en-US" dirty="0"/>
-          </a:p>
-        </p:txBody>
-      </p:sp>
-      <p:sp>
-        <p:nvSpPr>
-          <p:cNvPr id="3" name="Текст 2"/>
-          <p:cNvSpPr>
-            <a:spLocks noGrp="1"/>
-          </p:cNvSpPr>
-          <p:nvPr>
-            <p:ph type="body" sz="quarter" idx="13"/>
-          </p:nvPr>
-        </p:nvSpPr>
-        <p:spPr>
-          <a:prstGeom prst="rect">
-            <a:avLst/>
-          </a:prstGeom>
-          <a:noFill/>
-        </p:spPr>
-        <p:txBody>
-          <a:bodyPr/>
-          <a:lstStyle/>
-          <a:p>
-            <a:r>
-              <a:rPr lang="en-US" dirty="0" smtClean="0">
-                <a:solidFill>
-                  <a:schemeClr val="bg1"/>
-                </a:solidFill>
-              </a:rPr>
-              <a:t>PLAN</a:t>
-            </a:r>
-            <a:endParaRPr lang="ru-RU" dirty="0">
-              <a:solidFill>
-                <a:schemeClr val="bg1"/>
-              </a:solidFill>
-            </a:endParaRPr>
-          </a:p>
-        </p:txBody>
-      </p:sp>
-      <p:pic>
-        <p:nvPicPr>
-          <p:cNvPr id="7" name="Picture 6" descr="EPAM_LOGO_gray_blue.png"/>
-          <p:cNvPicPr>
-            <a:picLocks noChangeAspect="1"/>
-          </p:cNvPicPr>
-          <p:nvPr/>
-        </p:nvPicPr>
-        <p:blipFill>
-          <a:blip r:embed="rId3" cstate="print">
-            <a:extLst>
-              <a:ext uri="{28A0092B-C50C-407E-A947-70E740481C1C}">
-                <a14:useLocalDpi xmlns:a14="http://schemas.microsoft.com/office/drawing/2010/main" val="0"/>
-              </a:ext>
-            </a:extLst>
-          </a:blip>
-          <a:stretch>
-            <a:fillRect/>
-          </a:stretch>
-        </p:blipFill>
-        <p:spPr>
-          <a:xfrm>
-            <a:off x="10258632" y="118371"/>
-            <a:ext cx="1669791" cy="654144"/>
-          </a:xfrm>
-          <a:prstGeom prst="rect">
-            <a:avLst/>
-          </a:prstGeom>
-        </p:spPr>
-      </p:pic>
-    </p:spTree>
-    <p:extLst>
-      <p:ext uri="{BB962C8B-B14F-4D97-AF65-F5344CB8AC3E}">
-        <p14:creationId xmlns:p14="http://schemas.microsoft.com/office/powerpoint/2010/main" val="3649895856"/>
-      </p:ext>
-    </p:extLst>
-  </p:cSld>
-  <p:clrMapOvr>
-    <a:masterClrMapping/>
-  </p:clrMapOvr>
-  <p:timing>
-    <p:tnLst>
-      <p:par>
-        <p:cTn id="1" dur="indefinite" restart="never" nodeType="tmRoot"/>
-      </p:par>
-    </p:tnLst>
-  </p:timing>
-</p:sld>
-</file>
-
-<file path=ppt/slides/slide20.xml><?xml version="1.0" encoding="utf-8"?>
+<file path=ppt/slides/slide19.xml><?xml version="1.0" encoding="utf-8"?>
 <p:sld xmlns:a="http://schemas.openxmlformats.org/drawingml/2006/main" xmlns:r="http://schemas.openxmlformats.org/officeDocument/2006/relationships" xmlns:p="http://schemas.openxmlformats.org/presentationml/2006/main">
   <p:cSld>
     <p:spTree>
@@ -20930,7 +19454,224 @@
 </p:sld>
 </file>
 
-<file path=ppt/slides/slide21.xml><?xml version="1.0" encoding="utf-8"?>
+<file path=ppt/slides/slide2.xml><?xml version="1.0" encoding="utf-8"?>
+<p:sld xmlns:a="http://schemas.openxmlformats.org/drawingml/2006/main" xmlns:r="http://schemas.openxmlformats.org/officeDocument/2006/relationships" xmlns:p="http://schemas.openxmlformats.org/presentationml/2006/main">
+  <p:cSld>
+    <p:spTree>
+      <p:nvGrpSpPr>
+        <p:cNvPr id="1" name=""/>
+        <p:cNvGrpSpPr/>
+        <p:nvPr/>
+      </p:nvGrpSpPr>
+      <p:grpSpPr>
+        <a:xfrm>
+          <a:off x="0" y="0"/>
+          <a:ext cx="0" cy="0"/>
+          <a:chOff x="0" y="0"/>
+          <a:chExt cx="0" cy="0"/>
+        </a:xfrm>
+      </p:grpSpPr>
+      <p:sp>
+        <p:nvSpPr>
+          <p:cNvPr id="20" name="Содержимое 19"/>
+          <p:cNvSpPr>
+            <a:spLocks noGrp="1"/>
+          </p:cNvSpPr>
+          <p:nvPr>
+            <p:ph idx="1"/>
+          </p:nvPr>
+        </p:nvSpPr>
+        <p:spPr/>
+        <p:txBody>
+          <a:bodyPr>
+            <a:normAutofit/>
+          </a:bodyPr>
+          <a:lstStyle/>
+          <a:p>
+            <a:r>
+              <a:rPr lang="en-US" sz="4000" b="1" dirty="0">
+                <a:solidFill>
+                  <a:schemeClr val="tx1">
+                    <a:lumMod val="50000"/>
+                  </a:schemeClr>
+                </a:solidFill>
+              </a:rPr>
+              <a:t> UI Objects. JDI</a:t>
+            </a:r>
+          </a:p>
+          <a:p>
+            <a:pPr>
+              <a:buFont typeface="Wingdings" panose="05000000000000000000" pitchFamily="2" charset="2"/>
+              <a:buChar char="Ø"/>
+            </a:pPr>
+            <a:r>
+              <a:rPr lang="en-US" sz="4000" b="1" dirty="0">
+                <a:solidFill>
+                  <a:srgbClr val="00B050"/>
+                </a:solidFill>
+              </a:rPr>
+              <a:t> JDI. Composite elements</a:t>
+            </a:r>
+          </a:p>
+          <a:p>
+            <a:pPr>
+              <a:buFont typeface="Arial" panose="020B0604020202020204" pitchFamily="34" charset="0"/>
+              <a:buChar char="•"/>
+            </a:pPr>
+            <a:r>
+              <a:rPr lang="en-US" sz="4000" b="1" dirty="0" smtClean="0">
+                <a:solidFill>
+                  <a:schemeClr val="tx1">
+                    <a:lumMod val="50000"/>
+                  </a:schemeClr>
+                </a:solidFill>
+              </a:rPr>
+              <a:t> JDI Settings</a:t>
+            </a:r>
+            <a:endParaRPr lang="en-US" sz="4000" b="1" dirty="0">
+              <a:solidFill>
+                <a:schemeClr val="tx1">
+                  <a:lumMod val="50000"/>
+                </a:schemeClr>
+              </a:solidFill>
+            </a:endParaRPr>
+          </a:p>
+          <a:p>
+            <a:pPr>
+              <a:buFont typeface="Arial" panose="020B0604020202020204" pitchFamily="34" charset="0"/>
+              <a:buChar char="•"/>
+            </a:pPr>
+            <a:r>
+              <a:rPr lang="en-US" sz="4000" b="1" dirty="0" smtClean="0">
+                <a:solidFill>
+                  <a:schemeClr val="tx1">
+                    <a:lumMod val="50000"/>
+                  </a:schemeClr>
+                </a:solidFill>
+              </a:rPr>
+              <a:t> JDI for any UI</a:t>
+            </a:r>
+            <a:endParaRPr lang="ru-RU" sz="4000" b="1" dirty="0">
+              <a:solidFill>
+                <a:schemeClr val="tx1">
+                  <a:lumMod val="50000"/>
+                </a:schemeClr>
+              </a:solidFill>
+            </a:endParaRPr>
+          </a:p>
+        </p:txBody>
+      </p:sp>
+      <p:sp>
+        <p:nvSpPr>
+          <p:cNvPr id="2" name="Slide Number Placeholder 1"/>
+          <p:cNvSpPr>
+            <a:spLocks noGrp="1"/>
+          </p:cNvSpPr>
+          <p:nvPr>
+            <p:ph type="sldNum" sz="quarter" idx="4"/>
+          </p:nvPr>
+        </p:nvSpPr>
+        <p:spPr/>
+        <p:txBody>
+          <a:bodyPr/>
+          <a:lstStyle/>
+          <a:p>
+            <a:fld id="{DA896BDD-8C87-40D7-8650-5CFFA3FBC00B}" type="slidenum">
+              <a:rPr lang="en-US" smtClean="0"/>
+              <a:pPr/>
+              <a:t>2</a:t>
+            </a:fld>
+            <a:endParaRPr lang="en-US" dirty="0"/>
+          </a:p>
+        </p:txBody>
+      </p:sp>
+      <p:sp>
+        <p:nvSpPr>
+          <p:cNvPr id="3" name="Текст 2"/>
+          <p:cNvSpPr>
+            <a:spLocks noGrp="1"/>
+          </p:cNvSpPr>
+          <p:nvPr>
+            <p:ph type="body" sz="quarter" idx="13"/>
+          </p:nvPr>
+        </p:nvSpPr>
+        <p:spPr>
+          <a:prstGeom prst="rect">
+            <a:avLst/>
+          </a:prstGeom>
+          <a:noFill/>
+        </p:spPr>
+        <p:txBody>
+          <a:bodyPr/>
+          <a:lstStyle/>
+          <a:p>
+            <a:r>
+              <a:rPr lang="en-US" dirty="0" smtClean="0">
+                <a:solidFill>
+                  <a:schemeClr val="bg1"/>
+                </a:solidFill>
+              </a:rPr>
+              <a:t>PLAN</a:t>
+            </a:r>
+            <a:endParaRPr lang="ru-RU" dirty="0">
+              <a:solidFill>
+                <a:schemeClr val="bg1"/>
+              </a:solidFill>
+            </a:endParaRPr>
+          </a:p>
+        </p:txBody>
+      </p:sp>
+      <p:pic>
+        <p:nvPicPr>
+          <p:cNvPr id="7" name="Picture 6" descr="EPAM_LOGO_gray_blue.png"/>
+          <p:cNvPicPr>
+            <a:picLocks noChangeAspect="1"/>
+          </p:cNvPicPr>
+          <p:nvPr/>
+        </p:nvPicPr>
+        <p:blipFill>
+          <a:blip r:embed="rId3" cstate="print">
+            <a:extLst>
+              <a:ext uri="{28A0092B-C50C-407E-A947-70E740481C1C}">
+                <a14:useLocalDpi xmlns:a14="http://schemas.microsoft.com/office/drawing/2010/main" val="0"/>
+              </a:ext>
+            </a:extLst>
+          </a:blip>
+          <a:stretch>
+            <a:fillRect/>
+          </a:stretch>
+        </p:blipFill>
+        <p:spPr>
+          <a:xfrm>
+            <a:off x="10258632" y="118371"/>
+            <a:ext cx="1669791" cy="654144"/>
+          </a:xfrm>
+          <a:prstGeom prst="rect">
+            <a:avLst/>
+          </a:prstGeom>
+        </p:spPr>
+      </p:pic>
+    </p:spTree>
+    <p:extLst>
+      <p:ext uri="{BB962C8B-B14F-4D97-AF65-F5344CB8AC3E}">
+        <p14:creationId xmlns:p14="http://schemas.microsoft.com/office/powerpoint/2010/main" val="3649895856"/>
+      </p:ext>
+    </p:extLst>
+  </p:cSld>
+  <p:clrMapOvr>
+    <a:masterClrMapping/>
+  </p:clrMapOvr>
+  <p:timing>
+    <p:tnLst>
+      <p:par>
+        <p:cTn id="1" dur="indefinite" restart="never" nodeType="tmRoot"/>
+      </p:par>
+    </p:tnLst>
+  </p:timing>
+</p:sld>
+</file>
+
+<file path=ppt/slides/slide20.xml><?xml version="1.0" encoding="utf-8"?>
 <p:sld xmlns:a="http://schemas.openxmlformats.org/drawingml/2006/main" xmlns:r="http://schemas.openxmlformats.org/officeDocument/2006/relationships" xmlns:p="http://schemas.openxmlformats.org/presentationml/2006/main">
   <p:cSld>
     <p:spTree>
@@ -20970,15 +19711,7 @@
                   <a:schemeClr val="bg1"/>
                 </a:solidFill>
               </a:rPr>
-              <a:t>DEMO</a:t>
-            </a:r>
-            <a:r>
-              <a:rPr lang="en-US" dirty="0" smtClean="0">
-                <a:solidFill>
-                  <a:schemeClr val="bg1"/>
-                </a:solidFill>
-              </a:rPr>
-              <a:t>: simple elements</a:t>
+              <a:t>DEMO: simple elements</a:t>
             </a:r>
             <a:endParaRPr lang="ru-RU" dirty="0">
               <a:solidFill>
@@ -21066,7 +19799,7 @@
             <a:fld id="{DA896BDD-8C87-40D7-8650-5CFFA3FBC00B}" type="slidenum">
               <a:rPr lang="en-US" smtClean="0"/>
               <a:pPr/>
-              <a:t>21</a:t>
+              <a:t>20</a:t>
             </a:fld>
             <a:endParaRPr lang="en-US" dirty="0"/>
           </a:p>
@@ -21076,6 +19809,242 @@
     <p:extLst>
       <p:ext uri="{BB962C8B-B14F-4D97-AF65-F5344CB8AC3E}">
         <p14:creationId xmlns:p14="http://schemas.microsoft.com/office/powerpoint/2010/main" val="1311024531"/>
+      </p:ext>
+    </p:extLst>
+  </p:cSld>
+  <p:clrMapOvr>
+    <a:masterClrMapping/>
+  </p:clrMapOvr>
+  <p:timing>
+    <p:tnLst>
+      <p:par>
+        <p:cTn id="1" dur="indefinite" restart="never" nodeType="tmRoot">
+          <p:childTnLst>
+            <p:seq concurrent="1" nextAc="seek">
+              <p:cTn id="2" dur="indefinite" nodeType="mainSeq">
+                <p:childTnLst>
+                  <p:par>
+                    <p:cTn id="3" fill="hold">
+                      <p:stCondLst>
+                        <p:cond delay="indefinite"/>
+                        <p:cond evt="onBegin" delay="0">
+                          <p:tn val="2"/>
+                        </p:cond>
+                      </p:stCondLst>
+                      <p:childTnLst>
+                        <p:par>
+                          <p:cTn id="4" fill="hold">
+                            <p:stCondLst>
+                              <p:cond delay="0"/>
+                            </p:stCondLst>
+                            <p:childTnLst>
+                              <p:par>
+                                <p:cTn id="5" presetID="26" presetClass="emph" presetSubtype="0" repeatCount="2000" fill="hold" nodeType="withEffect">
+                                  <p:stCondLst>
+                                    <p:cond delay="1000"/>
+                                  </p:stCondLst>
+                                  <p:childTnLst>
+                                    <p:animEffect transition="out" filter="fade">
+                                      <p:cBhvr>
+                                        <p:cTn id="6" dur="500" tmFilter="0, 0; .2, .5; .8, .5; 1, 0"/>
+                                        <p:tgtEl>
+                                          <p:spTgt spid="11"/>
+                                        </p:tgtEl>
+                                      </p:cBhvr>
+                                    </p:animEffect>
+                                    <p:animScale>
+                                      <p:cBhvr>
+                                        <p:cTn id="7" dur="250" autoRev="1" fill="hold"/>
+                                        <p:tgtEl>
+                                          <p:spTgt spid="11"/>
+                                        </p:tgtEl>
+                                      </p:cBhvr>
+                                      <p:by x="105000" y="105000"/>
+                                    </p:animScale>
+                                  </p:childTnLst>
+                                </p:cTn>
+                              </p:par>
+                            </p:childTnLst>
+                          </p:cTn>
+                        </p:par>
+                      </p:childTnLst>
+                    </p:cTn>
+                  </p:par>
+                </p:childTnLst>
+              </p:cTn>
+              <p:prevCondLst>
+                <p:cond evt="onPrev" delay="0">
+                  <p:tgtEl>
+                    <p:sldTgt/>
+                  </p:tgtEl>
+                </p:cond>
+              </p:prevCondLst>
+              <p:nextCondLst>
+                <p:cond evt="onNext" delay="0">
+                  <p:tgtEl>
+                    <p:sldTgt/>
+                  </p:tgtEl>
+                </p:cond>
+              </p:nextCondLst>
+            </p:seq>
+          </p:childTnLst>
+        </p:cTn>
+      </p:par>
+    </p:tnLst>
+  </p:timing>
+</p:sld>
+</file>
+
+<file path=ppt/slides/slide21.xml><?xml version="1.0" encoding="utf-8"?>
+<p:sld xmlns:a="http://schemas.openxmlformats.org/drawingml/2006/main" xmlns:r="http://schemas.openxmlformats.org/officeDocument/2006/relationships" xmlns:p="http://schemas.openxmlformats.org/presentationml/2006/main">
+  <p:cSld>
+    <p:spTree>
+      <p:nvGrpSpPr>
+        <p:cNvPr id="1" name=""/>
+        <p:cNvGrpSpPr/>
+        <p:nvPr/>
+      </p:nvGrpSpPr>
+      <p:grpSpPr>
+        <a:xfrm>
+          <a:off x="0" y="0"/>
+          <a:ext cx="0" cy="0"/>
+          <a:chOff x="0" y="0"/>
+          <a:chExt cx="0" cy="0"/>
+        </a:xfrm>
+      </p:grpSpPr>
+      <p:sp>
+        <p:nvSpPr>
+          <p:cNvPr id="3" name="Текст 2"/>
+          <p:cNvSpPr>
+            <a:spLocks noGrp="1"/>
+          </p:cNvSpPr>
+          <p:nvPr>
+            <p:ph type="body" sz="quarter" idx="13"/>
+          </p:nvPr>
+        </p:nvSpPr>
+        <p:spPr>
+          <a:noFill/>
+        </p:spPr>
+        <p:txBody>
+          <a:bodyPr/>
+          <a:lstStyle/>
+          <a:p>
+            <a:r>
+              <a:rPr lang="en-US" dirty="0" smtClean="0">
+                <a:solidFill>
+                  <a:schemeClr val="bg1"/>
+                </a:solidFill>
+              </a:rPr>
+              <a:t>DEMO: </a:t>
+            </a:r>
+            <a:r>
+              <a:rPr lang="en-US" dirty="0" err="1" smtClean="0"/>
+              <a:t>jfindby</a:t>
+            </a:r>
+            <a:r>
+              <a:rPr lang="en-US" dirty="0" smtClean="0"/>
+              <a:t> </a:t>
+            </a:r>
+            <a:r>
+              <a:rPr lang="en-US" dirty="0" err="1" smtClean="0"/>
+              <a:t>annotaion</a:t>
+            </a:r>
+            <a:endParaRPr lang="ru-RU" dirty="0">
+              <a:solidFill>
+                <a:schemeClr val="bg1"/>
+              </a:solidFill>
+            </a:endParaRPr>
+          </a:p>
+        </p:txBody>
+      </p:sp>
+      <p:pic>
+        <p:nvPicPr>
+          <p:cNvPr id="7" name="Picture 6" descr="EPAM_LOGO_gray_blue.png"/>
+          <p:cNvPicPr>
+            <a:picLocks noChangeAspect="1"/>
+          </p:cNvPicPr>
+          <p:nvPr/>
+        </p:nvPicPr>
+        <p:blipFill>
+          <a:blip r:embed="rId3" cstate="print">
+            <a:extLst>
+              <a:ext uri="{28A0092B-C50C-407E-A947-70E740481C1C}">
+                <a14:useLocalDpi xmlns:a14="http://schemas.microsoft.com/office/drawing/2010/main" val="0"/>
+              </a:ext>
+            </a:extLst>
+          </a:blip>
+          <a:stretch>
+            <a:fillRect/>
+          </a:stretch>
+        </p:blipFill>
+        <p:spPr>
+          <a:xfrm>
+            <a:off x="10258632" y="118371"/>
+            <a:ext cx="1669791" cy="654144"/>
+          </a:xfrm>
+          <a:prstGeom prst="rect">
+            <a:avLst/>
+          </a:prstGeom>
+        </p:spPr>
+      </p:pic>
+      <p:pic>
+        <p:nvPicPr>
+          <p:cNvPr id="11" name="Picture 10"/>
+          <p:cNvPicPr>
+            <a:picLocks noChangeAspect="1"/>
+          </p:cNvPicPr>
+          <p:nvPr/>
+        </p:nvPicPr>
+        <p:blipFill>
+          <a:blip r:embed="rId4" cstate="print">
+            <a:extLst>
+              <a:ext uri="{28A0092B-C50C-407E-A947-70E740481C1C}">
+                <a14:useLocalDpi xmlns:a14="http://schemas.microsoft.com/office/drawing/2010/main" val="0"/>
+              </a:ext>
+            </a:extLst>
+          </a:blip>
+          <a:stretch>
+            <a:fillRect/>
+          </a:stretch>
+        </p:blipFill>
+        <p:spPr>
+          <a:xfrm>
+            <a:off x="3716654" y="1112647"/>
+            <a:ext cx="4758691" cy="4758691"/>
+          </a:xfrm>
+          <a:prstGeom prst="rect">
+            <a:avLst/>
+          </a:prstGeom>
+        </p:spPr>
+      </p:pic>
+      <p:sp>
+        <p:nvSpPr>
+          <p:cNvPr id="2" name="Slide Number Placeholder 1"/>
+          <p:cNvSpPr>
+            <a:spLocks noGrp="1"/>
+          </p:cNvSpPr>
+          <p:nvPr>
+            <p:ph type="sldNum" sz="quarter" idx="4"/>
+          </p:nvPr>
+        </p:nvSpPr>
+        <p:spPr/>
+        <p:txBody>
+          <a:bodyPr/>
+          <a:lstStyle/>
+          <a:p>
+            <a:fld id="{DA896BDD-8C87-40D7-8650-5CFFA3FBC00B}" type="slidenum">
+              <a:rPr lang="en-US" smtClean="0"/>
+              <a:pPr/>
+              <a:t>21</a:t>
+            </a:fld>
+            <a:endParaRPr lang="en-US" dirty="0"/>
+          </a:p>
+        </p:txBody>
+      </p:sp>
+    </p:spTree>
+    <p:extLst>
+      <p:ext uri="{BB962C8B-B14F-4D97-AF65-F5344CB8AC3E}">
+        <p14:creationId xmlns:p14="http://schemas.microsoft.com/office/powerpoint/2010/main" val="935038508"/>
       </p:ext>
     </p:extLst>
   </p:cSld>
@@ -21181,250 +20150,6 @@
       </p:grpSpPr>
       <p:sp>
         <p:nvSpPr>
-          <p:cNvPr id="3" name="Текст 2"/>
-          <p:cNvSpPr>
-            <a:spLocks noGrp="1"/>
-          </p:cNvSpPr>
-          <p:nvPr>
-            <p:ph type="body" sz="quarter" idx="13"/>
-          </p:nvPr>
-        </p:nvSpPr>
-        <p:spPr>
-          <a:noFill/>
-        </p:spPr>
-        <p:txBody>
-          <a:bodyPr/>
-          <a:lstStyle/>
-          <a:p>
-            <a:r>
-              <a:rPr lang="en-US" dirty="0" smtClean="0">
-                <a:solidFill>
-                  <a:schemeClr val="bg1"/>
-                </a:solidFill>
-              </a:rPr>
-              <a:t>DEMO</a:t>
-            </a:r>
-            <a:r>
-              <a:rPr lang="en-US" dirty="0" smtClean="0">
-                <a:solidFill>
-                  <a:schemeClr val="bg1"/>
-                </a:solidFill>
-              </a:rPr>
-              <a:t>: </a:t>
-            </a:r>
-            <a:r>
-              <a:rPr lang="en-US" dirty="0" err="1" smtClean="0"/>
-              <a:t>jfindby</a:t>
-            </a:r>
-            <a:r>
-              <a:rPr lang="en-US" dirty="0" smtClean="0"/>
-              <a:t> </a:t>
-            </a:r>
-            <a:r>
-              <a:rPr lang="en-US" dirty="0" err="1" smtClean="0"/>
-              <a:t>annotaion</a:t>
-            </a:r>
-            <a:endParaRPr lang="ru-RU" dirty="0">
-              <a:solidFill>
-                <a:schemeClr val="bg1"/>
-              </a:solidFill>
-            </a:endParaRPr>
-          </a:p>
-        </p:txBody>
-      </p:sp>
-      <p:pic>
-        <p:nvPicPr>
-          <p:cNvPr id="7" name="Picture 6" descr="EPAM_LOGO_gray_blue.png"/>
-          <p:cNvPicPr>
-            <a:picLocks noChangeAspect="1"/>
-          </p:cNvPicPr>
-          <p:nvPr/>
-        </p:nvPicPr>
-        <p:blipFill>
-          <a:blip r:embed="rId3" cstate="print">
-            <a:extLst>
-              <a:ext uri="{28A0092B-C50C-407E-A947-70E740481C1C}">
-                <a14:useLocalDpi xmlns:a14="http://schemas.microsoft.com/office/drawing/2010/main" val="0"/>
-              </a:ext>
-            </a:extLst>
-          </a:blip>
-          <a:stretch>
-            <a:fillRect/>
-          </a:stretch>
-        </p:blipFill>
-        <p:spPr>
-          <a:xfrm>
-            <a:off x="10258632" y="118371"/>
-            <a:ext cx="1669791" cy="654144"/>
-          </a:xfrm>
-          <a:prstGeom prst="rect">
-            <a:avLst/>
-          </a:prstGeom>
-        </p:spPr>
-      </p:pic>
-      <p:pic>
-        <p:nvPicPr>
-          <p:cNvPr id="11" name="Picture 10"/>
-          <p:cNvPicPr>
-            <a:picLocks noChangeAspect="1"/>
-          </p:cNvPicPr>
-          <p:nvPr/>
-        </p:nvPicPr>
-        <p:blipFill>
-          <a:blip r:embed="rId4" cstate="print">
-            <a:extLst>
-              <a:ext uri="{28A0092B-C50C-407E-A947-70E740481C1C}">
-                <a14:useLocalDpi xmlns:a14="http://schemas.microsoft.com/office/drawing/2010/main" val="0"/>
-              </a:ext>
-            </a:extLst>
-          </a:blip>
-          <a:stretch>
-            <a:fillRect/>
-          </a:stretch>
-        </p:blipFill>
-        <p:spPr>
-          <a:xfrm>
-            <a:off x="3716654" y="1112647"/>
-            <a:ext cx="4758691" cy="4758691"/>
-          </a:xfrm>
-          <a:prstGeom prst="rect">
-            <a:avLst/>
-          </a:prstGeom>
-        </p:spPr>
-      </p:pic>
-      <p:sp>
-        <p:nvSpPr>
-          <p:cNvPr id="2" name="Slide Number Placeholder 1"/>
-          <p:cNvSpPr>
-            <a:spLocks noGrp="1"/>
-          </p:cNvSpPr>
-          <p:nvPr>
-            <p:ph type="sldNum" sz="quarter" idx="4"/>
-          </p:nvPr>
-        </p:nvSpPr>
-        <p:spPr/>
-        <p:txBody>
-          <a:bodyPr/>
-          <a:lstStyle/>
-          <a:p>
-            <a:fld id="{DA896BDD-8C87-40D7-8650-5CFFA3FBC00B}" type="slidenum">
-              <a:rPr lang="en-US" smtClean="0"/>
-              <a:pPr/>
-              <a:t>22</a:t>
-            </a:fld>
-            <a:endParaRPr lang="en-US" dirty="0"/>
-          </a:p>
-        </p:txBody>
-      </p:sp>
-    </p:spTree>
-    <p:extLst>
-      <p:ext uri="{BB962C8B-B14F-4D97-AF65-F5344CB8AC3E}">
-        <p14:creationId xmlns:p14="http://schemas.microsoft.com/office/powerpoint/2010/main" val="935038508"/>
-      </p:ext>
-    </p:extLst>
-  </p:cSld>
-  <p:clrMapOvr>
-    <a:masterClrMapping/>
-  </p:clrMapOvr>
-  <p:timing>
-    <p:tnLst>
-      <p:par>
-        <p:cTn id="1" dur="indefinite" restart="never" nodeType="tmRoot">
-          <p:childTnLst>
-            <p:seq concurrent="1" nextAc="seek">
-              <p:cTn id="2" dur="indefinite" nodeType="mainSeq">
-                <p:childTnLst>
-                  <p:par>
-                    <p:cTn id="3" fill="hold">
-                      <p:stCondLst>
-                        <p:cond delay="indefinite"/>
-                        <p:cond evt="onBegin" delay="0">
-                          <p:tn val="2"/>
-                        </p:cond>
-                      </p:stCondLst>
-                      <p:childTnLst>
-                        <p:par>
-                          <p:cTn id="4" fill="hold">
-                            <p:stCondLst>
-                              <p:cond delay="0"/>
-                            </p:stCondLst>
-                            <p:childTnLst>
-                              <p:par>
-                                <p:cTn id="5" presetID="26" presetClass="emph" presetSubtype="0" repeatCount="2000" fill="hold" nodeType="withEffect">
-                                  <p:stCondLst>
-                                    <p:cond delay="1000"/>
-                                  </p:stCondLst>
-                                  <p:childTnLst>
-                                    <p:animEffect transition="out" filter="fade">
-                                      <p:cBhvr>
-                                        <p:cTn id="6" dur="500" tmFilter="0, 0; .2, .5; .8, .5; 1, 0"/>
-                                        <p:tgtEl>
-                                          <p:spTgt spid="11"/>
-                                        </p:tgtEl>
-                                      </p:cBhvr>
-                                    </p:animEffect>
-                                    <p:animScale>
-                                      <p:cBhvr>
-                                        <p:cTn id="7" dur="250" autoRev="1" fill="hold"/>
-                                        <p:tgtEl>
-                                          <p:spTgt spid="11"/>
-                                        </p:tgtEl>
-                                      </p:cBhvr>
-                                      <p:by x="105000" y="105000"/>
-                                    </p:animScale>
-                                  </p:childTnLst>
-                                </p:cTn>
-                              </p:par>
-                            </p:childTnLst>
-                          </p:cTn>
-                        </p:par>
-                      </p:childTnLst>
-                    </p:cTn>
-                  </p:par>
-                </p:childTnLst>
-              </p:cTn>
-              <p:prevCondLst>
-                <p:cond evt="onPrev" delay="0">
-                  <p:tgtEl>
-                    <p:sldTgt/>
-                  </p:tgtEl>
-                </p:cond>
-              </p:prevCondLst>
-              <p:nextCondLst>
-                <p:cond evt="onNext" delay="0">
-                  <p:tgtEl>
-                    <p:sldTgt/>
-                  </p:tgtEl>
-                </p:cond>
-              </p:nextCondLst>
-            </p:seq>
-          </p:childTnLst>
-        </p:cTn>
-      </p:par>
-    </p:tnLst>
-  </p:timing>
-</p:sld>
-</file>
-
-<file path=ppt/slides/slide23.xml><?xml version="1.0" encoding="utf-8"?>
-<p:sld xmlns:a="http://schemas.openxmlformats.org/drawingml/2006/main" xmlns:r="http://schemas.openxmlformats.org/officeDocument/2006/relationships" xmlns:p="http://schemas.openxmlformats.org/presentationml/2006/main">
-  <p:cSld>
-    <p:spTree>
-      <p:nvGrpSpPr>
-        <p:cNvPr id="1" name=""/>
-        <p:cNvGrpSpPr/>
-        <p:nvPr/>
-      </p:nvGrpSpPr>
-      <p:grpSpPr>
-        <a:xfrm>
-          <a:off x="0" y="0"/>
-          <a:ext cx="0" cy="0"/>
-          <a:chOff x="0" y="0"/>
-          <a:chExt cx="0" cy="0"/>
-        </a:xfrm>
-      </p:grpSpPr>
-      <p:sp>
-        <p:nvSpPr>
           <p:cNvPr id="5" name="Title 4"/>
           <p:cNvSpPr>
             <a:spLocks noGrp="1"/>
@@ -21464,7 +20189,7 @@
             <a:fld id="{DA896BDD-8C87-40D7-8650-5CFFA3FBC00B}" type="slidenum">
               <a:rPr lang="en-US" smtClean="0"/>
               <a:pPr/>
-              <a:t>23</a:t>
+              <a:t>22</a:t>
             </a:fld>
             <a:endParaRPr lang="en-US" dirty="0"/>
           </a:p>
@@ -21490,7 +20215,7 @@
 </p:sld>
 </file>
 
-<file path=ppt/slides/slide24.xml><?xml version="1.0" encoding="utf-8"?>
+<file path=ppt/slides/slide23.xml><?xml version="1.0" encoding="utf-8"?>
 <p:sld xmlns:a="http://schemas.openxmlformats.org/drawingml/2006/main" xmlns:r="http://schemas.openxmlformats.org/officeDocument/2006/relationships" xmlns:p="http://schemas.openxmlformats.org/presentationml/2006/main">
   <p:cSld>
     <p:spTree>
@@ -22360,7 +21085,7 @@
             <a:fld id="{DA896BDD-8C87-40D7-8650-5CFFA3FBC00B}" type="slidenum">
               <a:rPr lang="en-US" smtClean="0"/>
               <a:pPr/>
-              <a:t>24</a:t>
+              <a:t>23</a:t>
             </a:fld>
             <a:endParaRPr lang="en-US" dirty="0"/>
           </a:p>
@@ -22847,7 +21572,7 @@
 </p:sld>
 </file>
 
-<file path=ppt/slides/slide25.xml><?xml version="1.0" encoding="utf-8"?>
+<file path=ppt/slides/slide24.xml><?xml version="1.0" encoding="utf-8"?>
 <p:sld xmlns:a="http://schemas.openxmlformats.org/drawingml/2006/main" xmlns:r="http://schemas.openxmlformats.org/officeDocument/2006/relationships" xmlns:p="http://schemas.openxmlformats.org/presentationml/2006/main">
   <p:cSld>
     <p:spTree>
@@ -23374,27 +22099,7 @@
                   </a:schemeClr>
                 </a:solidFill>
               </a:rPr>
-              <a:t> </a:t>
-            </a:r>
-            <a:r>
-              <a:rPr lang="en-US" dirty="0" smtClean="0">
-                <a:solidFill>
-                  <a:schemeClr val="tx1">
-                    <a:lumMod val="50000"/>
-                  </a:schemeClr>
-                </a:solidFill>
-              </a:rPr>
-              <a:t>colors</a:t>
-            </a:r>
-            <a:r>
-              <a:rPr lang="en-US" dirty="0" smtClean="0">
-                <a:solidFill>
-                  <a:schemeClr val="tx1">
-                    <a:lumMod val="50000"/>
-                  </a:schemeClr>
-                </a:solidFill>
-              </a:rPr>
-              <a:t>;</a:t>
+              <a:t> colors;</a:t>
             </a:r>
           </a:p>
         </p:txBody>
@@ -24066,27 +22771,7 @@
                   </a:schemeClr>
                 </a:solidFill>
               </a:rPr>
-              <a:t> </a:t>
-            </a:r>
-            <a:r>
-              <a:rPr lang="en-US" sz="2800" dirty="0" smtClean="0">
-                <a:solidFill>
-                  <a:schemeClr val="tx1">
-                    <a:lumMod val="50000"/>
-                  </a:schemeClr>
-                </a:solidFill>
-              </a:rPr>
-              <a:t>offers</a:t>
-            </a:r>
-            <a:r>
-              <a:rPr lang="en-US" sz="2800" dirty="0" smtClean="0">
-                <a:solidFill>
-                  <a:schemeClr val="tx1">
-                    <a:lumMod val="50000"/>
-                  </a:schemeClr>
-                </a:solidFill>
-              </a:rPr>
-              <a:t>;</a:t>
+              <a:t> offers;</a:t>
             </a:r>
           </a:p>
         </p:txBody>
@@ -24109,7 +22794,7 @@
             <a:fld id="{DA896BDD-8C87-40D7-8650-5CFFA3FBC00B}" type="slidenum">
               <a:rPr lang="en-US" smtClean="0"/>
               <a:pPr/>
-              <a:t>25</a:t>
+              <a:t>24</a:t>
             </a:fld>
             <a:endParaRPr lang="en-US" dirty="0"/>
           </a:p>
@@ -24135,7 +22820,7 @@
 </p:sld>
 </file>
 
-<file path=ppt/slides/slide26.xml><?xml version="1.0" encoding="utf-8"?>
+<file path=ppt/slides/slide25.xml><?xml version="1.0" encoding="utf-8"?>
 <p:sld xmlns:a="http://schemas.openxmlformats.org/drawingml/2006/main" xmlns:r="http://schemas.openxmlformats.org/officeDocument/2006/relationships" xmlns:p="http://schemas.openxmlformats.org/presentationml/2006/main">
   <p:cSld>
     <p:spTree>
@@ -24281,19 +22966,11 @@
                   <a:srgbClr val="00B050"/>
                 </a:solidFill>
               </a:rPr>
-              <a:t>“.colors</a:t>
+              <a:t>“.colors"</a:t>
             </a:r>
             <a:r>
               <a:rPr lang="en-US" dirty="0" smtClean="0">
                 <a:solidFill>
-                  <a:srgbClr val="00B050"/>
-                </a:solidFill>
-              </a:rPr>
-              <a:t>"</a:t>
-            </a:r>
-            <a:r>
-              <a:rPr lang="en-US" dirty="0" smtClean="0">
-                <a:solidFill>
                   <a:schemeClr val="tx1">
                     <a:lumMod val="50000"/>
                   </a:schemeClr>
@@ -24301,13 +22978,6 @@
               </a:rPr>
               <a:t>)</a:t>
             </a:r>
-            <a:endParaRPr lang="en-US" dirty="0" smtClean="0">
-              <a:solidFill>
-                <a:schemeClr val="tx1">
-                  <a:lumMod val="50000"/>
-                </a:schemeClr>
-              </a:solidFill>
-            </a:endParaRPr>
           </a:p>
           <a:p>
             <a:pPr marL="0" indent="0">
@@ -24345,27 +23015,7 @@
                   </a:schemeClr>
                 </a:solidFill>
               </a:rPr>
-              <a:t> </a:t>
-            </a:r>
-            <a:r>
-              <a:rPr lang="en-US" dirty="0" smtClean="0">
-                <a:solidFill>
-                  <a:schemeClr val="tx1">
-                    <a:lumMod val="50000"/>
-                  </a:schemeClr>
-                </a:solidFill>
-              </a:rPr>
-              <a:t>colors</a:t>
-            </a:r>
-            <a:r>
-              <a:rPr lang="en-US" dirty="0" smtClean="0">
-                <a:solidFill>
-                  <a:schemeClr val="tx1">
-                    <a:lumMod val="50000"/>
-                  </a:schemeClr>
-                </a:solidFill>
-              </a:rPr>
-              <a:t>;</a:t>
+              <a:t> colors;</a:t>
             </a:r>
           </a:p>
         </p:txBody>
@@ -24651,13 +23301,6 @@
               </a:rPr>
               <a:t>)</a:t>
             </a:r>
-            <a:endParaRPr lang="en-US" sz="2800" dirty="0" smtClean="0">
-              <a:solidFill>
-                <a:schemeClr val="tx1">
-                  <a:lumMod val="50000"/>
-                </a:schemeClr>
-              </a:solidFill>
-            </a:endParaRPr>
           </a:p>
           <a:p>
             <a:pPr marL="0" indent="0">
@@ -24696,27 +23339,7 @@
                   </a:schemeClr>
                 </a:solidFill>
               </a:rPr>
-              <a:t> </a:t>
-            </a:r>
-            <a:r>
-              <a:rPr lang="en-US" sz="2800" dirty="0" smtClean="0">
-                <a:solidFill>
-                  <a:schemeClr val="tx1">
-                    <a:lumMod val="50000"/>
-                  </a:schemeClr>
-                </a:solidFill>
-              </a:rPr>
-              <a:t>offers</a:t>
-            </a:r>
-            <a:r>
-              <a:rPr lang="en-US" sz="2800" dirty="0" smtClean="0">
-                <a:solidFill>
-                  <a:schemeClr val="tx1">
-                    <a:lumMod val="50000"/>
-                  </a:schemeClr>
-                </a:solidFill>
-              </a:rPr>
-              <a:t>;</a:t>
+              <a:t> offers;</a:t>
             </a:r>
           </a:p>
         </p:txBody>
@@ -24739,7 +23362,7 @@
             <a:fld id="{DA896BDD-8C87-40D7-8650-5CFFA3FBC00B}" type="slidenum">
               <a:rPr lang="en-US" smtClean="0"/>
               <a:pPr/>
-              <a:t>26</a:t>
+              <a:t>25</a:t>
             </a:fld>
             <a:endParaRPr lang="en-US" dirty="0"/>
           </a:p>
@@ -24984,27 +23607,11 @@
                   <a:srgbClr val="00B050"/>
                 </a:solidFill>
               </a:rPr>
-              <a:t>“.</a:t>
+              <a:t>“.menu li”</a:t>
             </a:r>
             <a:r>
               <a:rPr lang="en-US" sz="2800" dirty="0" smtClean="0">
                 <a:solidFill>
-                  <a:srgbClr val="00B050"/>
-                </a:solidFill>
-              </a:rPr>
-              <a:t>menu li</a:t>
-            </a:r>
-            <a:r>
-              <a:rPr lang="en-US" sz="2800" dirty="0" smtClean="0">
-                <a:solidFill>
-                  <a:srgbClr val="00B050"/>
-                </a:solidFill>
-              </a:rPr>
-              <a:t>”</a:t>
-            </a:r>
-            <a:r>
-              <a:rPr lang="en-US" sz="2800" dirty="0" smtClean="0">
-                <a:solidFill>
                   <a:schemeClr val="tx1">
                     <a:lumMod val="50000"/>
                   </a:schemeClr>
@@ -25012,13 +23619,6 @@
               </a:rPr>
               <a:t>)</a:t>
             </a:r>
-            <a:endParaRPr lang="en-US" sz="2800" dirty="0" smtClean="0">
-              <a:solidFill>
-                <a:schemeClr val="tx1">
-                  <a:lumMod val="50000"/>
-                </a:schemeClr>
-              </a:solidFill>
-            </a:endParaRPr>
           </a:p>
           <a:p>
             <a:pPr marL="0" indent="0">
@@ -25369,7 +23969,7 @@
 </p:sld>
 </file>
 
-<file path=ppt/slides/slide27.xml><?xml version="1.0" encoding="utf-8"?>
+<file path=ppt/slides/slide26.xml><?xml version="1.0" encoding="utf-8"?>
 <p:sld xmlns:a="http://schemas.openxmlformats.org/drawingml/2006/main" xmlns:r="http://schemas.openxmlformats.org/officeDocument/2006/relationships" xmlns:p="http://schemas.openxmlformats.org/presentationml/2006/main">
   <p:cSld>
     <p:spTree>
@@ -25497,7 +24097,7 @@
             <a:fld id="{DA896BDD-8C87-40D7-8650-5CFFA3FBC00B}" type="slidenum">
               <a:rPr lang="en-US" smtClean="0"/>
               <a:pPr/>
-              <a:t>27</a:t>
+              <a:t>26</a:t>
             </a:fld>
             <a:endParaRPr lang="en-US" dirty="0"/>
           </a:p>
@@ -25593,7 +24193,7 @@
 </p:sld>
 </file>
 
-<file path=ppt/slides/slide28.xml><?xml version="1.0" encoding="utf-8"?>
+<file path=ppt/slides/slide27.xml><?xml version="1.0" encoding="utf-8"?>
 <p:sld xmlns:a="http://schemas.openxmlformats.org/drawingml/2006/main" xmlns:r="http://schemas.openxmlformats.org/officeDocument/2006/relationships" xmlns:p="http://schemas.openxmlformats.org/presentationml/2006/main">
   <p:cSld>
     <p:spTree>
@@ -25655,7 +24255,7 @@
             <a:fld id="{DA896BDD-8C87-40D7-8650-5CFFA3FBC00B}" type="slidenum">
               <a:rPr lang="en-US" smtClean="0"/>
               <a:pPr/>
-              <a:t>28</a:t>
+              <a:t>27</a:t>
             </a:fld>
             <a:endParaRPr lang="en-US" dirty="0"/>
           </a:p>
@@ -25681,7 +24281,7 @@
 </p:sld>
 </file>
 
-<file path=ppt/slides/slide29.xml><?xml version="1.0" encoding="utf-8"?>
+<file path=ppt/slides/slide28.xml><?xml version="1.0" encoding="utf-8"?>
 <p:sld xmlns:a="http://schemas.openxmlformats.org/drawingml/2006/main" xmlns:r="http://schemas.openxmlformats.org/officeDocument/2006/relationships" xmlns:p="http://schemas.openxmlformats.org/presentationml/2006/main">
   <p:cSld>
     <p:spTree>
@@ -25716,7 +24316,7 @@
             <a:fld id="{DA896BDD-8C87-40D7-8650-5CFFA3FBC00B}" type="slidenum">
               <a:rPr lang="en-US" smtClean="0"/>
               <a:pPr/>
-              <a:t>29</a:t>
+              <a:t>28</a:t>
             </a:fld>
             <a:endParaRPr lang="en-US" dirty="0"/>
           </a:p>
@@ -28516,256 +27116,7 @@
 </p:sld>
 </file>
 
-<file path=ppt/slides/slide3.xml><?xml version="1.0" encoding="utf-8"?>
-<p:sld xmlns:a="http://schemas.openxmlformats.org/drawingml/2006/main" xmlns:r="http://schemas.openxmlformats.org/officeDocument/2006/relationships" xmlns:p="http://schemas.openxmlformats.org/presentationml/2006/main">
-  <p:cSld>
-    <p:spTree>
-      <p:nvGrpSpPr>
-        <p:cNvPr id="1" name=""/>
-        <p:cNvGrpSpPr/>
-        <p:nvPr/>
-      </p:nvGrpSpPr>
-      <p:grpSpPr>
-        <a:xfrm>
-          <a:off x="0" y="0"/>
-          <a:ext cx="0" cy="0"/>
-          <a:chOff x="0" y="0"/>
-          <a:chExt cx="0" cy="0"/>
-        </a:xfrm>
-      </p:grpSpPr>
-      <p:sp>
-        <p:nvSpPr>
-          <p:cNvPr id="20" name="Содержимое 19"/>
-          <p:cNvSpPr>
-            <a:spLocks noGrp="1"/>
-          </p:cNvSpPr>
-          <p:nvPr>
-            <p:ph idx="1"/>
-          </p:nvPr>
-        </p:nvSpPr>
-        <p:spPr/>
-        <p:txBody>
-          <a:bodyPr>
-            <a:normAutofit/>
-          </a:bodyPr>
-          <a:lstStyle/>
-          <a:p>
-            <a:r>
-              <a:rPr lang="en-US" sz="4000" b="1" dirty="0">
-                <a:solidFill>
-                  <a:schemeClr val="tx1">
-                    <a:lumMod val="50000"/>
-                  </a:schemeClr>
-                </a:solidFill>
-              </a:rPr>
-              <a:t> </a:t>
-            </a:r>
-            <a:r>
-              <a:rPr lang="en-US" sz="4000" b="1" dirty="0" smtClean="0">
-                <a:solidFill>
-                  <a:schemeClr val="tx1">
-                    <a:lumMod val="50000"/>
-                  </a:schemeClr>
-                </a:solidFill>
-              </a:rPr>
-              <a:t>JDI ?</a:t>
-            </a:r>
-            <a:endParaRPr lang="en-US" sz="4000" b="1" dirty="0">
-              <a:solidFill>
-                <a:schemeClr val="tx1">
-                  <a:lumMod val="50000"/>
-                </a:schemeClr>
-              </a:solidFill>
-            </a:endParaRPr>
-          </a:p>
-          <a:p>
-            <a:r>
-              <a:rPr lang="en-US" sz="4000" b="1" dirty="0" smtClean="0">
-                <a:solidFill>
-                  <a:schemeClr val="tx1">
-                    <a:lumMod val="50000"/>
-                  </a:schemeClr>
-                </a:solidFill>
-              </a:rPr>
-              <a:t> Simple Test</a:t>
-            </a:r>
-          </a:p>
-          <a:p>
-            <a:r>
-              <a:rPr lang="en-US" sz="4000" b="1" dirty="0">
-                <a:solidFill>
-                  <a:schemeClr val="tx1">
-                    <a:lumMod val="50000"/>
-                  </a:schemeClr>
-                </a:solidFill>
-              </a:rPr>
-              <a:t> </a:t>
-            </a:r>
-            <a:r>
-              <a:rPr lang="en-US" sz="4000" b="1" dirty="0" smtClean="0">
-                <a:solidFill>
-                  <a:schemeClr val="tx1">
-                    <a:lumMod val="50000"/>
-                  </a:schemeClr>
-                </a:solidFill>
-              </a:rPr>
-              <a:t>UI Objects</a:t>
-            </a:r>
-          </a:p>
-          <a:p>
-            <a:r>
-              <a:rPr lang="en-US" sz="4000" b="1" dirty="0" smtClean="0">
-                <a:solidFill>
-                  <a:schemeClr val="tx1">
-                    <a:lumMod val="50000"/>
-                  </a:schemeClr>
-                </a:solidFill>
-              </a:rPr>
-              <a:t> Simple Elements</a:t>
-            </a:r>
-          </a:p>
-          <a:p>
-            <a:r>
-              <a:rPr lang="en-US" sz="4000" b="1" dirty="0">
-                <a:solidFill>
-                  <a:schemeClr val="tx1">
-                    <a:lumMod val="50000"/>
-                  </a:schemeClr>
-                </a:solidFill>
-              </a:rPr>
-              <a:t> </a:t>
-            </a:r>
-            <a:r>
-              <a:rPr lang="en-US" sz="4000" b="1" dirty="0" smtClean="0">
-                <a:solidFill>
-                  <a:schemeClr val="tx1">
-                    <a:lumMod val="50000"/>
-                  </a:schemeClr>
-                </a:solidFill>
-              </a:rPr>
-              <a:t>Complex Elements</a:t>
-            </a:r>
-            <a:endParaRPr lang="ru-RU" sz="4000" b="1" dirty="0">
-              <a:solidFill>
-                <a:schemeClr val="tx1">
-                  <a:lumMod val="50000"/>
-                </a:schemeClr>
-              </a:solidFill>
-            </a:endParaRPr>
-          </a:p>
-        </p:txBody>
-      </p:sp>
-      <p:sp>
-        <p:nvSpPr>
-          <p:cNvPr id="2" name="Slide Number Placeholder 1"/>
-          <p:cNvSpPr>
-            <a:spLocks noGrp="1"/>
-          </p:cNvSpPr>
-          <p:nvPr>
-            <p:ph type="sldNum" sz="quarter" idx="4"/>
-          </p:nvPr>
-        </p:nvSpPr>
-        <p:spPr/>
-        <p:txBody>
-          <a:bodyPr/>
-          <a:lstStyle/>
-          <a:p>
-            <a:fld id="{DA896BDD-8C87-40D7-8650-5CFFA3FBC00B}" type="slidenum">
-              <a:rPr lang="en-US" smtClean="0"/>
-              <a:pPr/>
-              <a:t>3</a:t>
-            </a:fld>
-            <a:endParaRPr lang="en-US" dirty="0"/>
-          </a:p>
-        </p:txBody>
-      </p:sp>
-      <p:sp>
-        <p:nvSpPr>
-          <p:cNvPr id="3" name="Текст 2"/>
-          <p:cNvSpPr>
-            <a:spLocks noGrp="1"/>
-          </p:cNvSpPr>
-          <p:nvPr>
-            <p:ph type="body" sz="quarter" idx="13"/>
-          </p:nvPr>
-        </p:nvSpPr>
-        <p:spPr>
-          <a:prstGeom prst="rect">
-            <a:avLst/>
-          </a:prstGeom>
-          <a:noFill/>
-        </p:spPr>
-        <p:txBody>
-          <a:bodyPr/>
-          <a:lstStyle/>
-          <a:p>
-            <a:r>
-              <a:rPr lang="en-US" dirty="0" smtClean="0">
-                <a:solidFill>
-                  <a:schemeClr val="bg1"/>
-                </a:solidFill>
-              </a:rPr>
-              <a:t>AGENDA</a:t>
-            </a:r>
-            <a:endParaRPr lang="ru-RU" dirty="0">
-              <a:solidFill>
-                <a:schemeClr val="bg1"/>
-              </a:solidFill>
-            </a:endParaRPr>
-          </a:p>
-        </p:txBody>
-      </p:sp>
-      <p:pic>
-        <p:nvPicPr>
-          <p:cNvPr id="7" name="Picture 6" descr="EPAM_LOGO_gray_blue.png"/>
-          <p:cNvPicPr>
-            <a:picLocks noChangeAspect="1"/>
-          </p:cNvPicPr>
-          <p:nvPr/>
-        </p:nvPicPr>
-        <p:blipFill>
-          <a:blip r:embed="rId3" cstate="print">
-            <a:extLst>
-              <a:ext uri="{28A0092B-C50C-407E-A947-70E740481C1C}">
-                <a14:useLocalDpi xmlns:a14="http://schemas.microsoft.com/office/drawing/2010/main" val="0"/>
-              </a:ext>
-            </a:extLst>
-          </a:blip>
-          <a:stretch>
-            <a:fillRect/>
-          </a:stretch>
-        </p:blipFill>
-        <p:spPr>
-          <a:xfrm>
-            <a:off x="10258632" y="118371"/>
-            <a:ext cx="1669791" cy="654144"/>
-          </a:xfrm>
-          <a:prstGeom prst="rect">
-            <a:avLst/>
-          </a:prstGeom>
-        </p:spPr>
-      </p:pic>
-    </p:spTree>
-    <p:extLst>
-      <p:ext uri="{BB962C8B-B14F-4D97-AF65-F5344CB8AC3E}">
-        <p14:creationId xmlns:p14="http://schemas.microsoft.com/office/powerpoint/2010/main" val="4039792371"/>
-      </p:ext>
-    </p:extLst>
-  </p:cSld>
-  <p:clrMapOvr>
-    <a:masterClrMapping/>
-  </p:clrMapOvr>
-  <p:timing>
-    <p:tnLst>
-      <p:par>
-        <p:cTn id="1" dur="indefinite" restart="never" nodeType="tmRoot"/>
-      </p:par>
-    </p:tnLst>
-  </p:timing>
-</p:sld>
-</file>
-
-<file path=ppt/slides/slide30.xml><?xml version="1.0" encoding="utf-8"?>
+<file path=ppt/slides/slide29.xml><?xml version="1.0" encoding="utf-8"?>
 <p:sld xmlns:a="http://schemas.openxmlformats.org/drawingml/2006/main" xmlns:r="http://schemas.openxmlformats.org/officeDocument/2006/relationships" xmlns:p="http://schemas.openxmlformats.org/presentationml/2006/main">
   <p:cSld>
     <p:spTree>
@@ -28901,7 +27252,7 @@
             <a:fld id="{DA896BDD-8C87-40D7-8650-5CFFA3FBC00B}" type="slidenum">
               <a:rPr lang="en-US" smtClean="0"/>
               <a:pPr/>
-              <a:t>30</a:t>
+              <a:t>29</a:t>
             </a:fld>
             <a:endParaRPr lang="en-US" dirty="0"/>
           </a:p>
@@ -28997,7 +27348,256 @@
 </p:sld>
 </file>
 
-<file path=ppt/slides/slide31.xml><?xml version="1.0" encoding="utf-8"?>
+<file path=ppt/slides/slide3.xml><?xml version="1.0" encoding="utf-8"?>
+<p:sld xmlns:a="http://schemas.openxmlformats.org/drawingml/2006/main" xmlns:r="http://schemas.openxmlformats.org/officeDocument/2006/relationships" xmlns:p="http://schemas.openxmlformats.org/presentationml/2006/main">
+  <p:cSld>
+    <p:spTree>
+      <p:nvGrpSpPr>
+        <p:cNvPr id="1" name=""/>
+        <p:cNvGrpSpPr/>
+        <p:nvPr/>
+      </p:nvGrpSpPr>
+      <p:grpSpPr>
+        <a:xfrm>
+          <a:off x="0" y="0"/>
+          <a:ext cx="0" cy="0"/>
+          <a:chOff x="0" y="0"/>
+          <a:chExt cx="0" cy="0"/>
+        </a:xfrm>
+      </p:grpSpPr>
+      <p:sp>
+        <p:nvSpPr>
+          <p:cNvPr id="20" name="Содержимое 19"/>
+          <p:cNvSpPr>
+            <a:spLocks noGrp="1"/>
+          </p:cNvSpPr>
+          <p:nvPr>
+            <p:ph idx="1"/>
+          </p:nvPr>
+        </p:nvSpPr>
+        <p:spPr/>
+        <p:txBody>
+          <a:bodyPr>
+            <a:normAutofit/>
+          </a:bodyPr>
+          <a:lstStyle/>
+          <a:p>
+            <a:r>
+              <a:rPr lang="en-US" sz="4000" b="1" dirty="0">
+                <a:solidFill>
+                  <a:schemeClr val="tx1">
+                    <a:lumMod val="50000"/>
+                  </a:schemeClr>
+                </a:solidFill>
+              </a:rPr>
+              <a:t> </a:t>
+            </a:r>
+            <a:r>
+              <a:rPr lang="en-US" sz="4000" b="1" dirty="0" smtClean="0">
+                <a:solidFill>
+                  <a:schemeClr val="tx1">
+                    <a:lumMod val="50000"/>
+                  </a:schemeClr>
+                </a:solidFill>
+              </a:rPr>
+              <a:t>JDI ?</a:t>
+            </a:r>
+            <a:endParaRPr lang="en-US" sz="4000" b="1" dirty="0">
+              <a:solidFill>
+                <a:schemeClr val="tx1">
+                  <a:lumMod val="50000"/>
+                </a:schemeClr>
+              </a:solidFill>
+            </a:endParaRPr>
+          </a:p>
+          <a:p>
+            <a:r>
+              <a:rPr lang="en-US" sz="4000" b="1" dirty="0" smtClean="0">
+                <a:solidFill>
+                  <a:schemeClr val="tx1">
+                    <a:lumMod val="50000"/>
+                  </a:schemeClr>
+                </a:solidFill>
+              </a:rPr>
+              <a:t> Simple Test</a:t>
+            </a:r>
+          </a:p>
+          <a:p>
+            <a:r>
+              <a:rPr lang="en-US" sz="4000" b="1" dirty="0">
+                <a:solidFill>
+                  <a:schemeClr val="tx1">
+                    <a:lumMod val="50000"/>
+                  </a:schemeClr>
+                </a:solidFill>
+              </a:rPr>
+              <a:t> </a:t>
+            </a:r>
+            <a:r>
+              <a:rPr lang="en-US" sz="4000" b="1" dirty="0" smtClean="0">
+                <a:solidFill>
+                  <a:schemeClr val="tx1">
+                    <a:lumMod val="50000"/>
+                  </a:schemeClr>
+                </a:solidFill>
+              </a:rPr>
+              <a:t>UI Objects</a:t>
+            </a:r>
+          </a:p>
+          <a:p>
+            <a:r>
+              <a:rPr lang="en-US" sz="4000" b="1" dirty="0" smtClean="0">
+                <a:solidFill>
+                  <a:schemeClr val="tx1">
+                    <a:lumMod val="50000"/>
+                  </a:schemeClr>
+                </a:solidFill>
+              </a:rPr>
+              <a:t> Simple Elements</a:t>
+            </a:r>
+          </a:p>
+          <a:p>
+            <a:r>
+              <a:rPr lang="en-US" sz="4000" b="1" dirty="0">
+                <a:solidFill>
+                  <a:schemeClr val="tx1">
+                    <a:lumMod val="50000"/>
+                  </a:schemeClr>
+                </a:solidFill>
+              </a:rPr>
+              <a:t> </a:t>
+            </a:r>
+            <a:r>
+              <a:rPr lang="en-US" sz="4000" b="1" dirty="0" smtClean="0">
+                <a:solidFill>
+                  <a:schemeClr val="tx1">
+                    <a:lumMod val="50000"/>
+                  </a:schemeClr>
+                </a:solidFill>
+              </a:rPr>
+              <a:t>Complex Elements</a:t>
+            </a:r>
+            <a:endParaRPr lang="ru-RU" sz="4000" b="1" dirty="0">
+              <a:solidFill>
+                <a:schemeClr val="tx1">
+                  <a:lumMod val="50000"/>
+                </a:schemeClr>
+              </a:solidFill>
+            </a:endParaRPr>
+          </a:p>
+        </p:txBody>
+      </p:sp>
+      <p:sp>
+        <p:nvSpPr>
+          <p:cNvPr id="2" name="Slide Number Placeholder 1"/>
+          <p:cNvSpPr>
+            <a:spLocks noGrp="1"/>
+          </p:cNvSpPr>
+          <p:nvPr>
+            <p:ph type="sldNum" sz="quarter" idx="4"/>
+          </p:nvPr>
+        </p:nvSpPr>
+        <p:spPr/>
+        <p:txBody>
+          <a:bodyPr/>
+          <a:lstStyle/>
+          <a:p>
+            <a:fld id="{DA896BDD-8C87-40D7-8650-5CFFA3FBC00B}" type="slidenum">
+              <a:rPr lang="en-US" smtClean="0"/>
+              <a:pPr/>
+              <a:t>3</a:t>
+            </a:fld>
+            <a:endParaRPr lang="en-US" dirty="0"/>
+          </a:p>
+        </p:txBody>
+      </p:sp>
+      <p:sp>
+        <p:nvSpPr>
+          <p:cNvPr id="3" name="Текст 2"/>
+          <p:cNvSpPr>
+            <a:spLocks noGrp="1"/>
+          </p:cNvSpPr>
+          <p:nvPr>
+            <p:ph type="body" sz="quarter" idx="13"/>
+          </p:nvPr>
+        </p:nvSpPr>
+        <p:spPr>
+          <a:prstGeom prst="rect">
+            <a:avLst/>
+          </a:prstGeom>
+          <a:noFill/>
+        </p:spPr>
+        <p:txBody>
+          <a:bodyPr/>
+          <a:lstStyle/>
+          <a:p>
+            <a:r>
+              <a:rPr lang="en-US" dirty="0" smtClean="0">
+                <a:solidFill>
+                  <a:schemeClr val="bg1"/>
+                </a:solidFill>
+              </a:rPr>
+              <a:t>AGENDA</a:t>
+            </a:r>
+            <a:endParaRPr lang="ru-RU" dirty="0">
+              <a:solidFill>
+                <a:schemeClr val="bg1"/>
+              </a:solidFill>
+            </a:endParaRPr>
+          </a:p>
+        </p:txBody>
+      </p:sp>
+      <p:pic>
+        <p:nvPicPr>
+          <p:cNvPr id="7" name="Picture 6" descr="EPAM_LOGO_gray_blue.png"/>
+          <p:cNvPicPr>
+            <a:picLocks noChangeAspect="1"/>
+          </p:cNvPicPr>
+          <p:nvPr/>
+        </p:nvPicPr>
+        <p:blipFill>
+          <a:blip r:embed="rId3" cstate="print">
+            <a:extLst>
+              <a:ext uri="{28A0092B-C50C-407E-A947-70E740481C1C}">
+                <a14:useLocalDpi xmlns:a14="http://schemas.microsoft.com/office/drawing/2010/main" val="0"/>
+              </a:ext>
+            </a:extLst>
+          </a:blip>
+          <a:stretch>
+            <a:fillRect/>
+          </a:stretch>
+        </p:blipFill>
+        <p:spPr>
+          <a:xfrm>
+            <a:off x="10258632" y="118371"/>
+            <a:ext cx="1669791" cy="654144"/>
+          </a:xfrm>
+          <a:prstGeom prst="rect">
+            <a:avLst/>
+          </a:prstGeom>
+        </p:spPr>
+      </p:pic>
+    </p:spTree>
+    <p:extLst>
+      <p:ext uri="{BB962C8B-B14F-4D97-AF65-F5344CB8AC3E}">
+        <p14:creationId xmlns:p14="http://schemas.microsoft.com/office/powerpoint/2010/main" val="4039792371"/>
+      </p:ext>
+    </p:extLst>
+  </p:cSld>
+  <p:clrMapOvr>
+    <a:masterClrMapping/>
+  </p:clrMapOvr>
+  <p:timing>
+    <p:tnLst>
+      <p:par>
+        <p:cTn id="1" dur="indefinite" restart="never" nodeType="tmRoot"/>
+      </p:par>
+    </p:tnLst>
+  </p:timing>
+</p:sld>
+</file>
+
+<file path=ppt/slides/slide30.xml><?xml version="1.0" encoding="utf-8"?>
 <p:sld xmlns:a="http://schemas.openxmlformats.org/drawingml/2006/main" xmlns:r="http://schemas.openxmlformats.org/officeDocument/2006/relationships" xmlns:p="http://schemas.openxmlformats.org/presentationml/2006/main">
   <p:cSld>
     <p:spTree>
@@ -29147,7 +27747,7 @@
             <a:fld id="{DA896BDD-8C87-40D7-8650-5CFFA3FBC00B}" type="slidenum">
               <a:rPr lang="en-US" smtClean="0"/>
               <a:pPr/>
-              <a:t>31</a:t>
+              <a:t>30</a:t>
             </a:fld>
             <a:endParaRPr lang="en-US" dirty="0"/>
           </a:p>
@@ -29173,7 +27773,7 @@
 </p:sld>
 </file>
 
-<file path=ppt/slides/slide32.xml><?xml version="1.0" encoding="utf-8"?>
+<file path=ppt/slides/slide31.xml><?xml version="1.0" encoding="utf-8"?>
 <p:sld xmlns:a="http://schemas.openxmlformats.org/drawingml/2006/main" xmlns:r="http://schemas.openxmlformats.org/officeDocument/2006/relationships" xmlns:p="http://schemas.openxmlformats.org/presentationml/2006/main">
   <p:cSld>
     <p:spTree>
@@ -30126,7 +28726,7 @@
             <a:fld id="{DA896BDD-8C87-40D7-8650-5CFFA3FBC00B}" type="slidenum">
               <a:rPr lang="en-US" smtClean="0"/>
               <a:pPr/>
-              <a:t>32</a:t>
+              <a:t>31</a:t>
             </a:fld>
             <a:endParaRPr lang="en-US" dirty="0"/>
           </a:p>
@@ -30152,7 +28752,7 @@
 </p:sld>
 </file>
 
-<file path=ppt/slides/slide33.xml><?xml version="1.0" encoding="utf-8"?>
+<file path=ppt/slides/slide32.xml><?xml version="1.0" encoding="utf-8"?>
 <p:sld xmlns:a="http://schemas.openxmlformats.org/drawingml/2006/main" xmlns:r="http://schemas.openxmlformats.org/officeDocument/2006/relationships" xmlns:p="http://schemas.openxmlformats.org/presentationml/2006/main">
   <p:cSld>
     <p:spTree>
@@ -31884,7 +30484,7 @@
             <a:fld id="{DA896BDD-8C87-40D7-8650-5CFFA3FBC00B}" type="slidenum">
               <a:rPr lang="en-US" smtClean="0"/>
               <a:pPr/>
-              <a:t>33</a:t>
+              <a:t>32</a:t>
             </a:fld>
             <a:endParaRPr lang="en-US" dirty="0"/>
           </a:p>
@@ -32043,7 +30643,7 @@
 </p:sld>
 </file>
 
-<file path=ppt/slides/slide34.xml><?xml version="1.0" encoding="utf-8"?>
+<file path=ppt/slides/slide33.xml><?xml version="1.0" encoding="utf-8"?>
 <p:sld xmlns:a="http://schemas.openxmlformats.org/drawingml/2006/main" xmlns:r="http://schemas.openxmlformats.org/officeDocument/2006/relationships" xmlns:p="http://schemas.openxmlformats.org/presentationml/2006/main">
   <p:cSld>
     <p:spTree>
@@ -35893,7 +34493,7 @@
             <a:fld id="{DA896BDD-8C87-40D7-8650-5CFFA3FBC00B}" type="slidenum">
               <a:rPr lang="en-US" smtClean="0"/>
               <a:pPr/>
-              <a:t>34</a:t>
+              <a:t>33</a:t>
             </a:fld>
             <a:endParaRPr lang="en-US" dirty="0"/>
           </a:p>
@@ -36052,7 +34652,7 @@
 </p:sld>
 </file>
 
-<file path=ppt/slides/slide35.xml><?xml version="1.0" encoding="utf-8"?>
+<file path=ppt/slides/slide34.xml><?xml version="1.0" encoding="utf-8"?>
 <p:sld xmlns:a="http://schemas.openxmlformats.org/drawingml/2006/main" xmlns:r="http://schemas.openxmlformats.org/officeDocument/2006/relationships" xmlns:p="http://schemas.openxmlformats.org/presentationml/2006/main">
   <p:cSld>
     <p:spTree>
@@ -36196,7 +34796,7 @@
             <a:fld id="{DA896BDD-8C87-40D7-8650-5CFFA3FBC00B}" type="slidenum">
               <a:rPr lang="en-US" smtClean="0"/>
               <a:pPr/>
-              <a:t>35</a:t>
+              <a:t>34</a:t>
             </a:fld>
             <a:endParaRPr lang="en-US" dirty="0"/>
           </a:p>
@@ -36292,7 +34892,7 @@
 </p:sld>
 </file>
 
-<file path=ppt/slides/slide36.xml><?xml version="1.0" encoding="utf-8"?>
+<file path=ppt/slides/slide35.xml><?xml version="1.0" encoding="utf-8"?>
 <p:sld xmlns:a="http://schemas.openxmlformats.org/drawingml/2006/main" xmlns:r="http://schemas.openxmlformats.org/officeDocument/2006/relationships" xmlns:p="http://schemas.openxmlformats.org/presentationml/2006/main">
   <p:cSld>
     <p:spTree>
@@ -36473,7 +35073,7 @@
             <a:fld id="{DA896BDD-8C87-40D7-8650-5CFFA3FBC00B}" type="slidenum">
               <a:rPr lang="en-US" smtClean="0"/>
               <a:pPr/>
-              <a:t>36</a:t>
+              <a:t>35</a:t>
             </a:fld>
             <a:endParaRPr lang="en-US" dirty="0"/>
           </a:p>
@@ -36499,7 +35099,7 @@
 </p:sld>
 </file>
 
-<file path=ppt/slides/slide37.xml><?xml version="1.0" encoding="utf-8"?>
+<file path=ppt/slides/slide36.xml><?xml version="1.0" encoding="utf-8"?>
 <p:sld xmlns:a="http://schemas.openxmlformats.org/drawingml/2006/main" xmlns:r="http://schemas.openxmlformats.org/officeDocument/2006/relationships" xmlns:p="http://schemas.openxmlformats.org/presentationml/2006/main">
   <p:cSld>
     <p:spTree>
@@ -36733,7 +35333,7 @@
             <a:fld id="{DA896BDD-8C87-40D7-8650-5CFFA3FBC00B}" type="slidenum">
               <a:rPr lang="en-US" smtClean="0"/>
               <a:pPr/>
-              <a:t>37</a:t>
+              <a:t>36</a:t>
             </a:fld>
             <a:endParaRPr lang="en-US" dirty="0"/>
           </a:p>

</xml_diff>